<commit_message>
need UI and update
</commit_message>
<xml_diff>
--- a/Tetris.pptx
+++ b/Tetris.pptx
@@ -6580,7 +6580,7 @@
         <p:spPr>
           <a:xfrm>
             <a:off x="0" y="55398"/>
-            <a:ext cx="6293708" cy="2554545"/>
+            <a:ext cx="2553730" cy="4555093"/>
           </a:xfrm>
           <a:prstGeom prst="rect">
             <a:avLst/>
@@ -6598,7 +6598,7 @@
               <a:t>Class </a:t>
             </a:r>
             <a:r>
-              <a:rPr lang="en-US" altLang="ko-KR" sz="1000" smtClean="0"/>
+              <a:rPr lang="en-US" altLang="ko-KR" sz="1000" dirty="0" err="1" smtClean="0"/>
               <a:t>TetrisChief</a:t>
             </a:r>
             <a:endParaRPr lang="en-US" altLang="ko-KR" sz="1000" dirty="0" smtClean="0"/>
@@ -6760,7 +6760,7 @@
             </a:r>
             <a:r>
               <a:rPr lang="en-US" altLang="ko-KR" sz="1000" dirty="0" err="1" smtClean="0"/>
-              <a:t>MoveLine</a:t>
+              <a:t>MoveLineDown</a:t>
             </a:r>
             <a:r>
               <a:rPr lang="en-US" altLang="ko-KR" sz="1000" dirty="0" smtClean="0"/>
@@ -6769,6 +6769,20 @@
           </a:p>
           <a:p>
             <a:r>
+              <a:rPr lang="en-US" altLang="ko-KR" sz="1000" dirty="0" smtClean="0"/>
+              <a:t>      void </a:t>
+            </a:r>
+            <a:r>
+              <a:rPr lang="en-US" altLang="ko-KR" sz="1000" dirty="0" err="1" smtClean="0"/>
+              <a:t>MoveLineUp</a:t>
+            </a:r>
+            <a:r>
+              <a:rPr lang="en-US" altLang="ko-KR" sz="1000" dirty="0" smtClean="0"/>
+              <a:t>();</a:t>
+            </a:r>
+          </a:p>
+          <a:p>
+            <a:r>
               <a:rPr lang="en-US" altLang="ko-KR" sz="1000" dirty="0"/>
               <a:t> </a:t>
             </a:r>
@@ -6811,6 +6825,105 @@
               <a:rPr lang="en-US" altLang="ko-KR" sz="1000" dirty="0" smtClean="0"/>
               <a:t>}</a:t>
             </a:r>
+          </a:p>
+          <a:p>
+            <a:endParaRPr lang="en-US" altLang="ko-KR" sz="1000" dirty="0"/>
+          </a:p>
+          <a:p>
+            <a:endParaRPr lang="en-US" altLang="ko-KR" sz="1000" dirty="0" smtClean="0"/>
+          </a:p>
+          <a:p>
+            <a:r>
+              <a:rPr lang="en-US" altLang="ko-KR" sz="1000" dirty="0" err="1"/>
+              <a:t>TetrisChief</a:t>
+            </a:r>
+            <a:r>
+              <a:rPr lang="en-US" altLang="ko-KR" sz="1000" dirty="0"/>
+              <a:t>::</a:t>
+            </a:r>
+            <a:r>
+              <a:rPr lang="en-US" altLang="ko-KR" sz="1000" dirty="0" err="1"/>
+              <a:t>TetrisChief</a:t>
+            </a:r>
+            <a:r>
+              <a:rPr lang="en-US" altLang="ko-KR" sz="1000" dirty="0"/>
+              <a:t>()</a:t>
+            </a:r>
+          </a:p>
+          <a:p>
+            <a:r>
+              <a:rPr lang="en-US" altLang="ko-KR" sz="1000" dirty="0"/>
+              <a:t>{</a:t>
+            </a:r>
+          </a:p>
+          <a:p>
+            <a:r>
+              <a:rPr lang="en-US" altLang="ko-KR" sz="1000" dirty="0"/>
+              <a:t>   </a:t>
+            </a:r>
+          </a:p>
+          <a:p>
+            <a:r>
+              <a:rPr lang="en-US" altLang="ko-KR" sz="1000" dirty="0"/>
+              <a:t>}</a:t>
+            </a:r>
+          </a:p>
+          <a:p>
+            <a:endParaRPr lang="en-US" altLang="ko-KR" sz="1000" dirty="0"/>
+          </a:p>
+          <a:p>
+            <a:r>
+              <a:rPr lang="en-US" altLang="ko-KR" sz="1000" dirty="0" err="1"/>
+              <a:t>TetrisChief</a:t>
+            </a:r>
+            <a:r>
+              <a:rPr lang="en-US" altLang="ko-KR" sz="1000" dirty="0"/>
+              <a:t>:: </a:t>
+            </a:r>
+            <a:r>
+              <a:rPr lang="en-US" altLang="ko-KR" sz="1000" dirty="0" err="1"/>
+              <a:t>TetrisChief</a:t>
+            </a:r>
+            <a:r>
+              <a:rPr lang="en-US" altLang="ko-KR" sz="1000" dirty="0"/>
+              <a:t>(</a:t>
+            </a:r>
+            <a:r>
+              <a:rPr lang="en-US" altLang="ko-KR" sz="1000" dirty="0" err="1"/>
+              <a:t>int</a:t>
+            </a:r>
+            <a:r>
+              <a:rPr lang="en-US" altLang="ko-KR" sz="1000" dirty="0"/>
+              <a:t> (*map)[40][20])</a:t>
+            </a:r>
+          </a:p>
+          <a:p>
+            <a:r>
+              <a:rPr lang="en-US" altLang="ko-KR" sz="1000" dirty="0"/>
+              <a:t>{</a:t>
+            </a:r>
+          </a:p>
+          <a:p>
+            <a:r>
+              <a:rPr lang="en-US" altLang="ko-KR" sz="1000" dirty="0"/>
+              <a:t>   </a:t>
+            </a:r>
+            <a:r>
+              <a:rPr lang="en-US" altLang="ko-KR" sz="1000" dirty="0" err="1"/>
+              <a:t>iMap</a:t>
+            </a:r>
+            <a:r>
+              <a:rPr lang="en-US" altLang="ko-KR" sz="1000" dirty="0"/>
+              <a:t> = map;</a:t>
+            </a:r>
+          </a:p>
+          <a:p>
+            <a:r>
+              <a:rPr lang="en-US" altLang="ko-KR" sz="1000" dirty="0"/>
+              <a:t>}</a:t>
+            </a:r>
+          </a:p>
+          <a:p>
             <a:endParaRPr lang="ko-KR" altLang="en-US" sz="1000" dirty="0"/>
           </a:p>
         </p:txBody>
@@ -6823,8 +6936,8 @@
         </p:nvSpPr>
         <p:spPr>
           <a:xfrm>
-            <a:off x="2316480" y="55398"/>
-            <a:ext cx="3215640" cy="5632311"/>
+            <a:off x="2734963" y="178964"/>
+            <a:ext cx="3215640" cy="7017306"/>
           </a:xfrm>
           <a:prstGeom prst="rect">
             <a:avLst/>
@@ -6838,16 +6951,12 @@
           <a:lstStyle/>
           <a:p>
             <a:r>
-              <a:rPr lang="en-US" altLang="ko-KR" sz="1000" dirty="0" err="1" smtClean="0"/>
-              <a:t>TetrisChief</a:t>
-            </a:r>
-            <a:r>
-              <a:rPr lang="en-US" altLang="ko-KR" sz="1000" dirty="0" smtClean="0"/>
-              <a:t>::</a:t>
-            </a:r>
-            <a:r>
-              <a:rPr lang="en-US" altLang="ko-KR" sz="1000" dirty="0" err="1" smtClean="0"/>
-              <a:t>TetrisChief</a:t>
+              <a:rPr lang="en-US" altLang="ko-KR" sz="1000" dirty="0" smtClean="0"/>
+              <a:t>Void </a:t>
+            </a:r>
+            <a:r>
+              <a:rPr lang="en-US" altLang="ko-KR" sz="1000" dirty="0" err="1" smtClean="0"/>
+              <a:t>CheckLine</a:t>
             </a:r>
             <a:r>
               <a:rPr lang="en-US" altLang="ko-KR" sz="1000" dirty="0" smtClean="0"/>
@@ -6862,353 +6971,494 @@
           </a:p>
           <a:p>
             <a:r>
-              <a:rPr lang="en-US" altLang="ko-KR" sz="1000" dirty="0" smtClean="0"/>
+              <a:rPr lang="en-US" altLang="ko-KR" sz="1000" dirty="0"/>
+              <a:t> </a:t>
+            </a:r>
+            <a:r>
+              <a:rPr lang="en-US" altLang="ko-KR" sz="1000" dirty="0" smtClean="0"/>
+              <a:t>  bool </a:t>
+            </a:r>
+            <a:r>
+              <a:rPr lang="en-US" altLang="ko-KR" sz="1000" dirty="0" err="1" smtClean="0"/>
+              <a:t>isFull</a:t>
+            </a:r>
+            <a:r>
+              <a:rPr lang="en-US" altLang="ko-KR" sz="1000" dirty="0" smtClean="0"/>
+              <a:t> = true;</a:t>
+            </a:r>
+          </a:p>
+          <a:p>
+            <a:endParaRPr lang="en-US" altLang="ko-KR" sz="1000" dirty="0" smtClean="0"/>
+          </a:p>
+          <a:p>
+            <a:r>
+              <a:rPr lang="en-US" altLang="ko-KR" sz="1000" dirty="0"/>
+              <a:t> </a:t>
+            </a:r>
+            <a:r>
+              <a:rPr lang="en-US" altLang="ko-KR" sz="1000" dirty="0" smtClean="0"/>
+              <a:t>  if(</a:t>
+            </a:r>
+            <a:r>
+              <a:rPr lang="en-US" altLang="ko-KR" sz="1000" dirty="0" err="1" smtClean="0"/>
+              <a:t>GetisChecked</a:t>
+            </a:r>
+            <a:r>
+              <a:rPr lang="en-US" altLang="ko-KR" sz="1000" dirty="0" smtClean="0"/>
+              <a:t>())</a:t>
+            </a:r>
+          </a:p>
+          <a:p>
+            <a:r>
+              <a:rPr lang="en-US" altLang="ko-KR" sz="1000" dirty="0"/>
+              <a:t> </a:t>
+            </a:r>
+            <a:r>
+              <a:rPr lang="en-US" altLang="ko-KR" sz="1000" dirty="0" smtClean="0"/>
+              <a:t>  {</a:t>
+            </a:r>
+          </a:p>
+          <a:p>
+            <a:r>
+              <a:rPr lang="en-US" altLang="ko-KR" sz="1000" dirty="0" smtClean="0"/>
+              <a:t>      for(</a:t>
+            </a:r>
+            <a:r>
+              <a:rPr lang="en-US" altLang="ko-KR" sz="1000" dirty="0" err="1" smtClean="0"/>
+              <a:t>int</a:t>
+            </a:r>
+            <a:r>
+              <a:rPr lang="en-US" altLang="ko-KR" sz="1000" dirty="0" smtClean="0"/>
+              <a:t> y=38; y&gt;0 y--)</a:t>
+            </a:r>
+          </a:p>
+          <a:p>
+            <a:r>
+              <a:rPr lang="en-US" altLang="ko-KR" sz="1000" dirty="0"/>
+              <a:t> </a:t>
+            </a:r>
+            <a:r>
+              <a:rPr lang="en-US" altLang="ko-KR" sz="1000" dirty="0" smtClean="0"/>
+              <a:t>     {</a:t>
+            </a:r>
+          </a:p>
+          <a:p>
+            <a:r>
+              <a:rPr lang="en-US" altLang="ko-KR" sz="1000" dirty="0"/>
+              <a:t> </a:t>
+            </a:r>
+            <a:r>
+              <a:rPr lang="en-US" altLang="ko-KR" sz="1000" dirty="0" smtClean="0"/>
+              <a:t>        for(</a:t>
+            </a:r>
+            <a:r>
+              <a:rPr lang="en-US" altLang="ko-KR" sz="1000" dirty="0" err="1" smtClean="0"/>
+              <a:t>int</a:t>
+            </a:r>
+            <a:r>
+              <a:rPr lang="en-US" altLang="ko-KR" sz="1000" dirty="0" smtClean="0"/>
+              <a:t> x = 1; x&lt;18; x++)</a:t>
+            </a:r>
+          </a:p>
+          <a:p>
+            <a:r>
+              <a:rPr lang="en-US" altLang="ko-KR" sz="1000" dirty="0"/>
+              <a:t> </a:t>
+            </a:r>
+            <a:r>
+              <a:rPr lang="en-US" altLang="ko-KR" sz="1000" dirty="0" smtClean="0"/>
+              <a:t>        {</a:t>
+            </a:r>
+          </a:p>
+          <a:p>
+            <a:r>
+              <a:rPr lang="en-US" altLang="ko-KR" sz="1000" dirty="0"/>
+              <a:t> </a:t>
+            </a:r>
+            <a:r>
+              <a:rPr lang="en-US" altLang="ko-KR" sz="1000" dirty="0" smtClean="0"/>
+              <a:t>           if((*</a:t>
+            </a:r>
+            <a:r>
+              <a:rPr lang="en-US" altLang="ko-KR" sz="1000" dirty="0" err="1" smtClean="0"/>
+              <a:t>iMap</a:t>
+            </a:r>
+            <a:r>
+              <a:rPr lang="en-US" altLang="ko-KR" sz="1000" dirty="0" smtClean="0"/>
+              <a:t>)[y][x] == </a:t>
+            </a:r>
+            <a:r>
+              <a:rPr lang="en-US" altLang="ko-KR" sz="1000" dirty="0"/>
+              <a:t>0</a:t>
+            </a:r>
+            <a:r>
+              <a:rPr lang="en-US" altLang="ko-KR" sz="1000" dirty="0" smtClean="0"/>
+              <a:t>)</a:t>
+            </a:r>
+          </a:p>
+          <a:p>
+            <a:r>
+              <a:rPr lang="en-US" altLang="ko-KR" sz="1000" dirty="0"/>
+              <a:t> </a:t>
+            </a:r>
+            <a:r>
+              <a:rPr lang="en-US" altLang="ko-KR" sz="1000" dirty="0" smtClean="0"/>
+              <a:t>           {</a:t>
+            </a:r>
+          </a:p>
+          <a:p>
+            <a:r>
+              <a:rPr lang="en-US" altLang="ko-KR" sz="1000" dirty="0"/>
+              <a:t> </a:t>
+            </a:r>
+            <a:r>
+              <a:rPr lang="en-US" altLang="ko-KR" sz="1000" dirty="0" smtClean="0"/>
+              <a:t>              </a:t>
+            </a:r>
+            <a:r>
+              <a:rPr lang="en-US" altLang="ko-KR" sz="1000" dirty="0" err="1" smtClean="0"/>
+              <a:t>isFull</a:t>
+            </a:r>
+            <a:r>
+              <a:rPr lang="en-US" altLang="ko-KR" sz="1000" dirty="0" smtClean="0"/>
+              <a:t> = false;</a:t>
+            </a:r>
+          </a:p>
+          <a:p>
+            <a:r>
+              <a:rPr lang="en-US" altLang="ko-KR" sz="1000" dirty="0"/>
+              <a:t> </a:t>
+            </a:r>
+            <a:r>
+              <a:rPr lang="en-US" altLang="ko-KR" sz="1000" dirty="0" smtClean="0"/>
+              <a:t>           }</a:t>
+            </a:r>
+          </a:p>
+          <a:p>
+            <a:r>
+              <a:rPr lang="en-US" altLang="ko-KR" sz="1000" dirty="0"/>
+              <a:t> </a:t>
+            </a:r>
+            <a:r>
+              <a:rPr lang="en-US" altLang="ko-KR" sz="1000" dirty="0" smtClean="0"/>
+              <a:t>        }</a:t>
+            </a:r>
+          </a:p>
+          <a:p>
+            <a:r>
+              <a:rPr lang="en-US" altLang="ko-KR" sz="1000" dirty="0"/>
+              <a:t> </a:t>
+            </a:r>
+            <a:r>
+              <a:rPr lang="en-US" altLang="ko-KR" sz="1000" dirty="0" smtClean="0"/>
+              <a:t>        if(</a:t>
+            </a:r>
+            <a:r>
+              <a:rPr lang="en-US" altLang="ko-KR" sz="1000" dirty="0" err="1" smtClean="0"/>
+              <a:t>isFull</a:t>
+            </a:r>
+            <a:r>
+              <a:rPr lang="en-US" altLang="ko-KR" sz="1000" dirty="0" smtClean="0"/>
+              <a:t> == true)</a:t>
+            </a:r>
+          </a:p>
+          <a:p>
+            <a:r>
+              <a:rPr lang="en-US" altLang="ko-KR" sz="1000" dirty="0"/>
+              <a:t> </a:t>
+            </a:r>
+            <a:r>
+              <a:rPr lang="en-US" altLang="ko-KR" sz="1000" dirty="0" smtClean="0"/>
+              <a:t>        {</a:t>
+            </a:r>
+          </a:p>
+          <a:p>
+            <a:r>
+              <a:rPr lang="en-US" altLang="ko-KR" sz="1000" dirty="0"/>
+              <a:t> </a:t>
+            </a:r>
+            <a:r>
+              <a:rPr lang="en-US" altLang="ko-KR" sz="1000" dirty="0" smtClean="0"/>
+              <a:t>           </a:t>
+            </a:r>
+            <a:r>
+              <a:rPr lang="en-US" altLang="ko-KR" sz="1000" dirty="0" err="1" smtClean="0"/>
+              <a:t>lineNum</a:t>
+            </a:r>
+            <a:r>
+              <a:rPr lang="en-US" altLang="ko-KR" sz="1000" dirty="0" smtClean="0"/>
+              <a:t> = y;</a:t>
+            </a:r>
+          </a:p>
+          <a:p>
+            <a:r>
+              <a:rPr lang="en-US" altLang="ko-KR" sz="1000" dirty="0"/>
+              <a:t> </a:t>
+            </a:r>
+            <a:r>
+              <a:rPr lang="en-US" altLang="ko-KR" sz="1000" dirty="0" smtClean="0"/>
+              <a:t>           break;</a:t>
+            </a:r>
+          </a:p>
+          <a:p>
+            <a:r>
+              <a:rPr lang="en-US" altLang="ko-KR" sz="1000" dirty="0"/>
+              <a:t> </a:t>
+            </a:r>
+            <a:r>
+              <a:rPr lang="en-US" altLang="ko-KR" sz="1000" dirty="0" smtClean="0"/>
+              <a:t>        }</a:t>
+            </a:r>
+          </a:p>
+          <a:p>
+            <a:r>
+              <a:rPr lang="en-US" altLang="ko-KR" sz="1000" dirty="0"/>
+              <a:t> </a:t>
+            </a:r>
+            <a:r>
+              <a:rPr lang="en-US" altLang="ko-KR" sz="1000" dirty="0" smtClean="0"/>
+              <a:t>     }</a:t>
+            </a:r>
+            <a:endParaRPr lang="en-US" altLang="ko-KR" sz="1000" dirty="0"/>
+          </a:p>
+          <a:p>
+            <a:r>
+              <a:rPr lang="en-US" altLang="ko-KR" sz="1000" dirty="0" smtClean="0"/>
+              <a:t>   }</a:t>
+            </a:r>
+          </a:p>
+          <a:p>
+            <a:r>
+              <a:rPr lang="en-US" altLang="ko-KR" sz="1000" dirty="0" smtClean="0"/>
+              <a:t>}</a:t>
+            </a:r>
+            <a:endParaRPr lang="en-US" altLang="ko-KR" sz="1000" dirty="0"/>
+          </a:p>
+          <a:p>
+            <a:endParaRPr lang="en-US" altLang="ko-KR" sz="1000" dirty="0" smtClean="0"/>
+          </a:p>
+          <a:p>
+            <a:r>
+              <a:rPr lang="en-US" altLang="ko-KR" sz="1000" dirty="0"/>
+              <a:t>Void </a:t>
+            </a:r>
+            <a:r>
+              <a:rPr lang="en-US" altLang="ko-KR" sz="1000" dirty="0" err="1"/>
+              <a:t>MoveLineDown</a:t>
+            </a:r>
+            <a:r>
+              <a:rPr lang="en-US" altLang="ko-KR" sz="1000" dirty="0"/>
+              <a:t>()</a:t>
+            </a:r>
+          </a:p>
+          <a:p>
+            <a:r>
+              <a:rPr lang="en-US" altLang="ko-KR" sz="1000" dirty="0"/>
+              <a:t>{</a:t>
+            </a:r>
+          </a:p>
+          <a:p>
+            <a:r>
+              <a:rPr lang="en-US" altLang="ko-KR" sz="1000" dirty="0"/>
               <a:t>   </a:t>
             </a:r>
+            <a:r>
+              <a:rPr lang="en-US" altLang="ko-KR" sz="1000" dirty="0" err="1"/>
+              <a:t>int</a:t>
+            </a:r>
+            <a:r>
+              <a:rPr lang="en-US" altLang="ko-KR" sz="1000" dirty="0"/>
+              <a:t> </a:t>
+            </a:r>
+            <a:r>
+              <a:rPr lang="en-US" altLang="ko-KR" sz="1000" dirty="0" err="1"/>
+              <a:t>saveLine</a:t>
+            </a:r>
+            <a:r>
+              <a:rPr lang="en-US" altLang="ko-KR" sz="1000" dirty="0"/>
+              <a:t>[2][20];</a:t>
+            </a:r>
+          </a:p>
+          <a:p>
             <a:endParaRPr lang="en-US" altLang="ko-KR" sz="1000" dirty="0"/>
           </a:p>
           <a:p>
             <a:r>
-              <a:rPr lang="en-US" altLang="ko-KR" sz="1000" dirty="0" smtClean="0"/>
-              <a:t>}</a:t>
-            </a:r>
-          </a:p>
-          <a:p>
-            <a:endParaRPr lang="en-US" altLang="ko-KR" sz="1000" dirty="0"/>
-          </a:p>
-          <a:p>
-            <a:r>
-              <a:rPr lang="en-US" altLang="ko-KR" sz="1000" dirty="0" err="1" smtClean="0"/>
-              <a:t>TetrisChief</a:t>
-            </a:r>
-            <a:r>
-              <a:rPr lang="en-US" altLang="ko-KR" sz="1000" dirty="0" smtClean="0"/>
-              <a:t>:: </a:t>
-            </a:r>
-            <a:r>
-              <a:rPr lang="en-US" altLang="ko-KR" sz="1000" dirty="0" err="1" smtClean="0"/>
-              <a:t>TetrisChief</a:t>
-            </a:r>
-            <a:r>
-              <a:rPr lang="en-US" altLang="ko-KR" sz="1000" dirty="0" smtClean="0"/>
-              <a:t>(</a:t>
-            </a:r>
-            <a:r>
-              <a:rPr lang="en-US" altLang="ko-KR" sz="1000" dirty="0" err="1" smtClean="0"/>
+              <a:rPr lang="en-US" altLang="ko-KR" sz="1000" dirty="0"/>
+              <a:t>   for(</a:t>
+            </a:r>
+            <a:r>
+              <a:rPr lang="en-US" altLang="ko-KR" sz="1000" dirty="0" err="1"/>
               <a:t>int</a:t>
             </a:r>
             <a:r>
-              <a:rPr lang="en-US" altLang="ko-KR" sz="1000" dirty="0" smtClean="0"/>
-              <a:t> (*map)[40][20])</a:t>
-            </a:r>
-          </a:p>
-          <a:p>
-            <a:r>
-              <a:rPr lang="en-US" altLang="ko-KR" sz="1000" dirty="0" smtClean="0"/>
-              <a:t>{</a:t>
-            </a:r>
-          </a:p>
-          <a:p>
-            <a:r>
-              <a:rPr lang="en-US" altLang="ko-KR" sz="1000" dirty="0" smtClean="0"/>
-              <a:t>   </a:t>
-            </a:r>
-            <a:r>
-              <a:rPr lang="en-US" altLang="ko-KR" sz="1000" dirty="0" err="1" smtClean="0"/>
+              <a:rPr lang="en-US" altLang="ko-KR" sz="1000" dirty="0"/>
+              <a:t> y=1; y&lt;=</a:t>
+            </a:r>
+            <a:r>
+              <a:rPr lang="en-US" altLang="ko-KR" sz="1000" dirty="0" err="1"/>
+              <a:t>lineNum</a:t>
+            </a:r>
+            <a:r>
+              <a:rPr lang="en-US" altLang="ko-KR" sz="1000" dirty="0"/>
+              <a:t>; y++)</a:t>
+            </a:r>
+          </a:p>
+          <a:p>
+            <a:r>
+              <a:rPr lang="en-US" altLang="ko-KR" sz="1000" dirty="0"/>
+              <a:t>   {</a:t>
+            </a:r>
+          </a:p>
+          <a:p>
+            <a:r>
+              <a:rPr lang="en-US" altLang="ko-KR" sz="1000" dirty="0"/>
+              <a:t>      for(</a:t>
+            </a:r>
+            <a:r>
+              <a:rPr lang="en-US" altLang="ko-KR" sz="1000" dirty="0" err="1"/>
+              <a:t>int</a:t>
+            </a:r>
+            <a:r>
+              <a:rPr lang="en-US" altLang="ko-KR" sz="1000" dirty="0"/>
+              <a:t> x=1; x&lt;19; x++)</a:t>
+            </a:r>
+          </a:p>
+          <a:p>
+            <a:r>
+              <a:rPr lang="en-US" altLang="ko-KR" sz="1000" dirty="0"/>
+              <a:t>      {</a:t>
+            </a:r>
+          </a:p>
+          <a:p>
+            <a:r>
+              <a:rPr lang="en-US" altLang="ko-KR" sz="1000" dirty="0"/>
+              <a:t>         if(y==1)</a:t>
+            </a:r>
+          </a:p>
+          <a:p>
+            <a:r>
+              <a:rPr lang="en-US" altLang="ko-KR" sz="1000" dirty="0"/>
+              <a:t>         {</a:t>
+            </a:r>
+          </a:p>
+          <a:p>
+            <a:r>
+              <a:rPr lang="en-US" altLang="ko-KR" sz="1000" dirty="0"/>
+              <a:t>             </a:t>
+            </a:r>
+            <a:r>
+              <a:rPr lang="en-US" altLang="ko-KR" sz="1000" dirty="0" err="1"/>
+              <a:t>saveLine</a:t>
+            </a:r>
+            <a:r>
+              <a:rPr lang="en-US" altLang="ko-KR" sz="1000" dirty="0"/>
+              <a:t>[0][x] = (*</a:t>
+            </a:r>
+            <a:r>
+              <a:rPr lang="en-US" altLang="ko-KR" sz="1000" dirty="0" err="1"/>
               <a:t>iMap</a:t>
             </a:r>
             <a:r>
-              <a:rPr lang="en-US" altLang="ko-KR" sz="1000" dirty="0" smtClean="0"/>
-              <a:t> = map;</a:t>
-            </a:r>
-          </a:p>
-          <a:p>
-            <a:r>
-              <a:rPr lang="en-US" altLang="ko-KR" sz="1000" dirty="0" smtClean="0"/>
-              <a:t>}</a:t>
-            </a:r>
-          </a:p>
-          <a:p>
-            <a:endParaRPr lang="en-US" altLang="ko-KR" sz="1000" dirty="0"/>
-          </a:p>
-          <a:p>
-            <a:endParaRPr lang="en-US" altLang="ko-KR" sz="1000" dirty="0" smtClean="0"/>
-          </a:p>
-          <a:p>
-            <a:r>
-              <a:rPr lang="en-US" altLang="ko-KR" sz="1000" dirty="0" smtClean="0"/>
-              <a:t>Void </a:t>
-            </a:r>
-            <a:r>
-              <a:rPr lang="en-US" altLang="ko-KR" sz="1000" dirty="0" err="1" smtClean="0"/>
-              <a:t>CheckLine</a:t>
-            </a:r>
-            <a:r>
-              <a:rPr lang="en-US" altLang="ko-KR" sz="1000" dirty="0" smtClean="0"/>
-              <a:t>()</a:t>
-            </a:r>
-          </a:p>
-          <a:p>
-            <a:r>
-              <a:rPr lang="en-US" altLang="ko-KR" sz="1000" dirty="0" smtClean="0"/>
-              <a:t>{</a:t>
-            </a:r>
-          </a:p>
-          <a:p>
-            <a:r>
-              <a:rPr lang="en-US" altLang="ko-KR" sz="1000" dirty="0"/>
-              <a:t> </a:t>
-            </a:r>
-            <a:r>
-              <a:rPr lang="en-US" altLang="ko-KR" sz="1000" dirty="0" smtClean="0"/>
-              <a:t>  bool </a:t>
-            </a:r>
-            <a:r>
-              <a:rPr lang="en-US" altLang="ko-KR" sz="1000" dirty="0" err="1" smtClean="0"/>
-              <a:t>isFull</a:t>
-            </a:r>
-            <a:r>
-              <a:rPr lang="en-US" altLang="ko-KR" sz="1000" dirty="0" smtClean="0"/>
-              <a:t> = true;</a:t>
-            </a:r>
-          </a:p>
-          <a:p>
-            <a:endParaRPr lang="en-US" altLang="ko-KR" sz="1000" dirty="0" smtClean="0"/>
-          </a:p>
-          <a:p>
-            <a:r>
-              <a:rPr lang="en-US" altLang="ko-KR" sz="1000" dirty="0"/>
-              <a:t> </a:t>
-            </a:r>
-            <a:r>
-              <a:rPr lang="en-US" altLang="ko-KR" sz="1000" dirty="0" smtClean="0"/>
-              <a:t>  if(</a:t>
-            </a:r>
-            <a:r>
-              <a:rPr lang="en-US" altLang="ko-KR" sz="1000" dirty="0" err="1" smtClean="0"/>
-              <a:t>GetisChecked</a:t>
-            </a:r>
-            <a:r>
-              <a:rPr lang="en-US" altLang="ko-KR" sz="1000" dirty="0" smtClean="0"/>
-              <a:t>())</a:t>
-            </a:r>
-          </a:p>
-          <a:p>
-            <a:r>
-              <a:rPr lang="en-US" altLang="ko-KR" sz="1000" dirty="0"/>
-              <a:t> </a:t>
-            </a:r>
-            <a:r>
-              <a:rPr lang="en-US" altLang="ko-KR" sz="1000" dirty="0" smtClean="0"/>
-              <a:t>  {</a:t>
-            </a:r>
-          </a:p>
-          <a:p>
-            <a:r>
-              <a:rPr lang="en-US" altLang="ko-KR" sz="1000" dirty="0" smtClean="0"/>
-              <a:t>      for(</a:t>
-            </a:r>
-            <a:r>
-              <a:rPr lang="en-US" altLang="ko-KR" sz="1000" dirty="0" err="1" smtClean="0"/>
-              <a:t>int</a:t>
-            </a:r>
-            <a:r>
-              <a:rPr lang="en-US" altLang="ko-KR" sz="1000" dirty="0" smtClean="0"/>
-              <a:t> y=39; y&gt;0 y--)</a:t>
-            </a:r>
-          </a:p>
-          <a:p>
-            <a:r>
-              <a:rPr lang="en-US" altLang="ko-KR" sz="1000" dirty="0"/>
-              <a:t> </a:t>
-            </a:r>
-            <a:r>
-              <a:rPr lang="en-US" altLang="ko-KR" sz="1000" dirty="0" smtClean="0"/>
-              <a:t>     {</a:t>
-            </a:r>
-          </a:p>
-          <a:p>
-            <a:r>
-              <a:rPr lang="en-US" altLang="ko-KR" sz="1000" dirty="0"/>
-              <a:t> </a:t>
-            </a:r>
-            <a:r>
-              <a:rPr lang="en-US" altLang="ko-KR" sz="1000" dirty="0" smtClean="0"/>
-              <a:t>        for(</a:t>
-            </a:r>
-            <a:r>
-              <a:rPr lang="en-US" altLang="ko-KR" sz="1000" dirty="0" err="1" smtClean="0"/>
-              <a:t>int</a:t>
-            </a:r>
-            <a:r>
-              <a:rPr lang="en-US" altLang="ko-KR" sz="1000" dirty="0" smtClean="0"/>
-              <a:t> x = 1; x&lt;18; x++)</a:t>
-            </a:r>
-          </a:p>
-          <a:p>
-            <a:r>
-              <a:rPr lang="en-US" altLang="ko-KR" sz="1000" dirty="0"/>
-              <a:t> </a:t>
-            </a:r>
-            <a:r>
-              <a:rPr lang="en-US" altLang="ko-KR" sz="1000" dirty="0" smtClean="0"/>
-              <a:t>        {</a:t>
-            </a:r>
-          </a:p>
-          <a:p>
-            <a:r>
-              <a:rPr lang="en-US" altLang="ko-KR" sz="1000" dirty="0"/>
-              <a:t> </a:t>
-            </a:r>
-            <a:r>
-              <a:rPr lang="en-US" altLang="ko-KR" sz="1000" dirty="0" smtClean="0"/>
-              <a:t>           if((*</a:t>
-            </a:r>
-            <a:r>
-              <a:rPr lang="en-US" altLang="ko-KR" sz="1000" dirty="0" err="1" smtClean="0"/>
+              <a:rPr lang="en-US" altLang="ko-KR" sz="1000" dirty="0"/>
+              <a:t>)[y][x];</a:t>
+            </a:r>
+          </a:p>
+          <a:p>
+            <a:r>
+              <a:rPr lang="en-US" altLang="ko-KR" sz="1000" dirty="0"/>
+              <a:t>             (*</a:t>
+            </a:r>
+            <a:r>
+              <a:rPr lang="en-US" altLang="ko-KR" sz="1000" dirty="0" err="1"/>
               <a:t>iMap</a:t>
             </a:r>
             <a:r>
-              <a:rPr lang="en-US" altLang="ko-KR" sz="1000" dirty="0" smtClean="0"/>
-              <a:t>)[y][x] == </a:t>
-            </a:r>
-            <a:r>
-              <a:rPr lang="en-US" altLang="ko-KR" sz="1000" dirty="0"/>
-              <a:t>0</a:t>
-            </a:r>
-            <a:r>
-              <a:rPr lang="en-US" altLang="ko-KR" sz="1000" dirty="0" smtClean="0"/>
-              <a:t>)</a:t>
-            </a:r>
-          </a:p>
-          <a:p>
-            <a:r>
-              <a:rPr lang="en-US" altLang="ko-KR" sz="1000" dirty="0"/>
-              <a:t> </a:t>
-            </a:r>
-            <a:r>
-              <a:rPr lang="en-US" altLang="ko-KR" sz="1000" dirty="0" smtClean="0"/>
-              <a:t>           {</a:t>
-            </a:r>
-          </a:p>
-          <a:p>
-            <a:r>
-              <a:rPr lang="en-US" altLang="ko-KR" sz="1000" dirty="0"/>
-              <a:t> </a:t>
-            </a:r>
-            <a:r>
-              <a:rPr lang="en-US" altLang="ko-KR" sz="1000" dirty="0" smtClean="0"/>
-              <a:t>              </a:t>
-            </a:r>
-            <a:r>
-              <a:rPr lang="en-US" altLang="ko-KR" sz="1000" dirty="0" err="1" smtClean="0"/>
-              <a:t>isFull</a:t>
-            </a:r>
-            <a:r>
-              <a:rPr lang="en-US" altLang="ko-KR" sz="1000" dirty="0" smtClean="0"/>
-              <a:t> = false;</a:t>
-            </a:r>
-          </a:p>
-          <a:p>
-            <a:r>
-              <a:rPr lang="en-US" altLang="ko-KR" sz="1000" dirty="0"/>
-              <a:t> </a:t>
-            </a:r>
-            <a:r>
-              <a:rPr lang="en-US" altLang="ko-KR" sz="1000" dirty="0" smtClean="0"/>
-              <a:t>           }</a:t>
-            </a:r>
-          </a:p>
-          <a:p>
-            <a:r>
-              <a:rPr lang="en-US" altLang="ko-KR" sz="1000" dirty="0"/>
-              <a:t> </a:t>
-            </a:r>
-            <a:r>
-              <a:rPr lang="en-US" altLang="ko-KR" sz="1000" dirty="0" smtClean="0"/>
-              <a:t>        }</a:t>
-            </a:r>
-          </a:p>
-          <a:p>
-            <a:r>
-              <a:rPr lang="en-US" altLang="ko-KR" sz="1000" dirty="0"/>
-              <a:t> </a:t>
-            </a:r>
-            <a:r>
-              <a:rPr lang="en-US" altLang="ko-KR" sz="1000" dirty="0" smtClean="0"/>
-              <a:t>        if(</a:t>
-            </a:r>
-            <a:r>
-              <a:rPr lang="en-US" altLang="ko-KR" sz="1000" dirty="0" err="1" smtClean="0"/>
-              <a:t>isFull</a:t>
-            </a:r>
-            <a:r>
-              <a:rPr lang="en-US" altLang="ko-KR" sz="1000" dirty="0" smtClean="0"/>
-              <a:t> == true)</a:t>
-            </a:r>
-          </a:p>
-          <a:p>
-            <a:r>
-              <a:rPr lang="en-US" altLang="ko-KR" sz="1000" dirty="0"/>
-              <a:t> </a:t>
-            </a:r>
-            <a:r>
-              <a:rPr lang="en-US" altLang="ko-KR" sz="1000" dirty="0" smtClean="0"/>
-              <a:t>        {</a:t>
-            </a:r>
-          </a:p>
-          <a:p>
-            <a:r>
-              <a:rPr lang="en-US" altLang="ko-KR" sz="1000" dirty="0"/>
-              <a:t> </a:t>
-            </a:r>
-            <a:r>
-              <a:rPr lang="en-US" altLang="ko-KR" sz="1000" dirty="0" smtClean="0"/>
-              <a:t>           </a:t>
-            </a:r>
-            <a:r>
-              <a:rPr lang="en-US" altLang="ko-KR" sz="1000" dirty="0" err="1" smtClean="0"/>
-              <a:t>lineNum</a:t>
-            </a:r>
-            <a:r>
-              <a:rPr lang="en-US" altLang="ko-KR" sz="1000" dirty="0" smtClean="0"/>
-              <a:t> = y;</a:t>
-            </a:r>
-          </a:p>
-          <a:p>
-            <a:r>
-              <a:rPr lang="en-US" altLang="ko-KR" sz="1000" dirty="0"/>
-              <a:t> </a:t>
-            </a:r>
-            <a:r>
-              <a:rPr lang="en-US" altLang="ko-KR" sz="1000" dirty="0" smtClean="0"/>
-              <a:t>           break;</a:t>
-            </a:r>
-          </a:p>
-          <a:p>
-            <a:r>
-              <a:rPr lang="en-US" altLang="ko-KR" sz="1000" dirty="0"/>
-              <a:t> </a:t>
-            </a:r>
-            <a:r>
-              <a:rPr lang="en-US" altLang="ko-KR" sz="1000" dirty="0" smtClean="0"/>
-              <a:t>        }</a:t>
-            </a:r>
-          </a:p>
-          <a:p>
-            <a:r>
-              <a:rPr lang="en-US" altLang="ko-KR" sz="1000" dirty="0"/>
-              <a:t> </a:t>
-            </a:r>
-            <a:r>
-              <a:rPr lang="en-US" altLang="ko-KR" sz="1000" dirty="0" smtClean="0"/>
-              <a:t>     }</a:t>
-            </a:r>
-            <a:endParaRPr lang="en-US" altLang="ko-KR" sz="1000" dirty="0"/>
-          </a:p>
-          <a:p>
-            <a:r>
-              <a:rPr lang="en-US" altLang="ko-KR" sz="1000" dirty="0" smtClean="0"/>
+              <a:rPr lang="en-US" altLang="ko-KR" sz="1000" dirty="0"/>
+              <a:t>)[y][x] = 0;</a:t>
+            </a:r>
+          </a:p>
+          <a:p>
+            <a:r>
+              <a:rPr lang="en-US" altLang="ko-KR" sz="1000" dirty="0"/>
+              <a:t>         }</a:t>
+            </a:r>
+          </a:p>
+          <a:p>
+            <a:r>
+              <a:rPr lang="en-US" altLang="ko-KR" sz="1000" dirty="0"/>
+              <a:t>         </a:t>
+            </a:r>
+            <a:r>
+              <a:rPr lang="en-US" altLang="ko-KR" sz="1000" dirty="0" err="1"/>
+              <a:t>saveLine</a:t>
+            </a:r>
+            <a:r>
+              <a:rPr lang="en-US" altLang="ko-KR" sz="1000" dirty="0"/>
+              <a:t>[1][x] = (*</a:t>
+            </a:r>
+            <a:r>
+              <a:rPr lang="en-US" altLang="ko-KR" sz="1000" dirty="0" err="1"/>
+              <a:t>iMap</a:t>
+            </a:r>
+            <a:r>
+              <a:rPr lang="en-US" altLang="ko-KR" sz="1000" dirty="0"/>
+              <a:t>)[y][x];</a:t>
+            </a:r>
+          </a:p>
+          <a:p>
+            <a:r>
+              <a:rPr lang="en-US" altLang="ko-KR" sz="1000" dirty="0"/>
+              <a:t>         (*</a:t>
+            </a:r>
+            <a:r>
+              <a:rPr lang="en-US" altLang="ko-KR" sz="1000" dirty="0" err="1"/>
+              <a:t>iMap</a:t>
+            </a:r>
+            <a:r>
+              <a:rPr lang="en-US" altLang="ko-KR" sz="1000" dirty="0"/>
+              <a:t>)[y][x] = </a:t>
+            </a:r>
+            <a:r>
+              <a:rPr lang="en-US" altLang="ko-KR" sz="1000" dirty="0" err="1"/>
+              <a:t>saveLine</a:t>
+            </a:r>
+            <a:r>
+              <a:rPr lang="en-US" altLang="ko-KR" sz="1000" dirty="0"/>
+              <a:t>[0][x];</a:t>
+            </a:r>
+          </a:p>
+          <a:p>
+            <a:r>
+              <a:rPr lang="en-US" altLang="ko-KR" sz="1000" dirty="0"/>
+              <a:t>         </a:t>
+            </a:r>
+            <a:r>
+              <a:rPr lang="en-US" altLang="ko-KR" sz="1000" dirty="0" err="1"/>
+              <a:t>saveLine</a:t>
+            </a:r>
+            <a:r>
+              <a:rPr lang="en-US" altLang="ko-KR" sz="1000" dirty="0"/>
+              <a:t>[0][x] = </a:t>
+            </a:r>
+            <a:r>
+              <a:rPr lang="en-US" altLang="ko-KR" sz="1000" dirty="0" err="1"/>
+              <a:t>saveLine</a:t>
+            </a:r>
+            <a:r>
+              <a:rPr lang="en-US" altLang="ko-KR" sz="1000" dirty="0"/>
+              <a:t>[1][x];</a:t>
+            </a:r>
+          </a:p>
+          <a:p>
+            <a:r>
+              <a:rPr lang="en-US" altLang="ko-KR" sz="1000" dirty="0"/>
+              <a:t>      }</a:t>
+            </a:r>
+          </a:p>
+          <a:p>
+            <a:r>
+              <a:rPr lang="en-US" altLang="ko-KR" sz="1000" dirty="0"/>
               <a:t>   }</a:t>
             </a:r>
           </a:p>
@@ -7235,7 +7485,7 @@
         <p:spPr>
           <a:xfrm>
             <a:off x="5066682" y="55397"/>
-            <a:ext cx="3215640" cy="861774"/>
+            <a:ext cx="3215640" cy="4555093"/>
           </a:xfrm>
           <a:prstGeom prst="rect">
             <a:avLst/>
@@ -7254,7 +7504,7 @@
             </a:r>
             <a:r>
               <a:rPr lang="en-US" altLang="ko-KR" sz="1000" dirty="0" err="1" smtClean="0"/>
-              <a:t>MoveLine</a:t>
+              <a:t>MoveLineUp</a:t>
             </a:r>
             <a:r>
               <a:rPr lang="en-US" altLang="ko-KR" sz="1000" dirty="0" smtClean="0"/>
@@ -7269,18 +7519,877 @@
           </a:p>
           <a:p>
             <a:r>
+              <a:rPr lang="en-US" altLang="ko-KR" sz="1000" dirty="0"/>
+              <a:t>    </a:t>
+            </a:r>
+            <a:r>
+              <a:rPr lang="en-US" altLang="ko-KR" sz="1000" dirty="0" err="1"/>
+              <a:t>int</a:t>
+            </a:r>
+            <a:r>
+              <a:rPr lang="en-US" altLang="ko-KR" sz="1000" dirty="0"/>
+              <a:t> </a:t>
+            </a:r>
+            <a:r>
+              <a:rPr lang="en-US" altLang="ko-KR" sz="1000" dirty="0" err="1"/>
+              <a:t>saveLine</a:t>
+            </a:r>
+            <a:r>
+              <a:rPr lang="en-US" altLang="ko-KR" sz="1000" dirty="0"/>
+              <a:t>[2][20];</a:t>
+            </a:r>
+          </a:p>
+          <a:p>
+            <a:endParaRPr lang="en-US" altLang="ko-KR" sz="1000" dirty="0"/>
+          </a:p>
+          <a:p>
+            <a:r>
+              <a:rPr lang="en-US" altLang="ko-KR" sz="1000" dirty="0"/>
+              <a:t>   for(</a:t>
+            </a:r>
+            <a:r>
+              <a:rPr lang="en-US" altLang="ko-KR" sz="1000" dirty="0" err="1"/>
+              <a:t>int</a:t>
+            </a:r>
+            <a:r>
+              <a:rPr lang="en-US" altLang="ko-KR" sz="1000" dirty="0"/>
+              <a:t> </a:t>
+            </a:r>
+            <a:r>
+              <a:rPr lang="en-US" altLang="ko-KR" sz="1000" dirty="0" smtClean="0"/>
+              <a:t>y=38; y&gt;0; y--)</a:t>
+            </a:r>
+            <a:endParaRPr lang="en-US" altLang="ko-KR" sz="1000" dirty="0"/>
+          </a:p>
+          <a:p>
+            <a:r>
+              <a:rPr lang="en-US" altLang="ko-KR" sz="1000" dirty="0"/>
+              <a:t>   {</a:t>
+            </a:r>
+          </a:p>
+          <a:p>
+            <a:r>
+              <a:rPr lang="en-US" altLang="ko-KR" sz="1000" dirty="0"/>
+              <a:t>      for(</a:t>
+            </a:r>
+            <a:r>
+              <a:rPr lang="en-US" altLang="ko-KR" sz="1000" dirty="0" err="1"/>
+              <a:t>int</a:t>
+            </a:r>
+            <a:r>
+              <a:rPr lang="en-US" altLang="ko-KR" sz="1000" dirty="0"/>
+              <a:t> x=1; x&lt;19; x++)</a:t>
+            </a:r>
+          </a:p>
+          <a:p>
+            <a:r>
+              <a:rPr lang="en-US" altLang="ko-KR" sz="1000" dirty="0"/>
+              <a:t>      {</a:t>
+            </a:r>
+          </a:p>
+          <a:p>
+            <a:r>
+              <a:rPr lang="en-US" altLang="ko-KR" sz="1000" dirty="0"/>
+              <a:t>         if(y</a:t>
+            </a:r>
+            <a:r>
+              <a:rPr lang="en-US" altLang="ko-KR" sz="1000" dirty="0" smtClean="0"/>
+              <a:t>==38)</a:t>
+            </a:r>
+            <a:endParaRPr lang="en-US" altLang="ko-KR" sz="1000" dirty="0"/>
+          </a:p>
+          <a:p>
+            <a:r>
+              <a:rPr lang="en-US" altLang="ko-KR" sz="1000" dirty="0"/>
+              <a:t>         {</a:t>
+            </a:r>
+          </a:p>
+          <a:p>
+            <a:r>
+              <a:rPr lang="en-US" altLang="ko-KR" sz="1000" dirty="0"/>
+              <a:t>             </a:t>
+            </a:r>
+            <a:r>
+              <a:rPr lang="en-US" altLang="ko-KR" sz="1000" dirty="0" err="1"/>
+              <a:t>saveLine</a:t>
+            </a:r>
+            <a:r>
+              <a:rPr lang="en-US" altLang="ko-KR" sz="1000" dirty="0"/>
+              <a:t>[0][x] = (*</a:t>
+            </a:r>
+            <a:r>
+              <a:rPr lang="en-US" altLang="ko-KR" sz="1000" dirty="0" err="1"/>
+              <a:t>iMap</a:t>
+            </a:r>
+            <a:r>
+              <a:rPr lang="en-US" altLang="ko-KR" sz="1000" dirty="0"/>
+              <a:t>)[y][x];</a:t>
+            </a:r>
+          </a:p>
+          <a:p>
+            <a:r>
+              <a:rPr lang="en-US" altLang="ko-KR" sz="1000" dirty="0"/>
+              <a:t>             (*</a:t>
+            </a:r>
+            <a:r>
+              <a:rPr lang="en-US" altLang="ko-KR" sz="1000" dirty="0" err="1"/>
+              <a:t>iMap</a:t>
+            </a:r>
+            <a:r>
+              <a:rPr lang="en-US" altLang="ko-KR" sz="1000" dirty="0"/>
+              <a:t>)[y][x] = 0;</a:t>
+            </a:r>
+          </a:p>
+          <a:p>
+            <a:r>
+              <a:rPr lang="en-US" altLang="ko-KR" sz="1000" dirty="0"/>
+              <a:t>         }</a:t>
+            </a:r>
+          </a:p>
+          <a:p>
+            <a:r>
+              <a:rPr lang="en-US" altLang="ko-KR" sz="1000" dirty="0"/>
+              <a:t>         </a:t>
+            </a:r>
+            <a:r>
+              <a:rPr lang="en-US" altLang="ko-KR" sz="1000" dirty="0" err="1"/>
+              <a:t>saveLine</a:t>
+            </a:r>
+            <a:r>
+              <a:rPr lang="en-US" altLang="ko-KR" sz="1000" dirty="0"/>
+              <a:t>[1][x] = (*</a:t>
+            </a:r>
+            <a:r>
+              <a:rPr lang="en-US" altLang="ko-KR" sz="1000" dirty="0" err="1"/>
+              <a:t>iMap</a:t>
+            </a:r>
+            <a:r>
+              <a:rPr lang="en-US" altLang="ko-KR" sz="1000" dirty="0"/>
+              <a:t>)[y][x];</a:t>
+            </a:r>
+          </a:p>
+          <a:p>
+            <a:r>
+              <a:rPr lang="en-US" altLang="ko-KR" sz="1000" dirty="0"/>
+              <a:t>         (*</a:t>
+            </a:r>
+            <a:r>
+              <a:rPr lang="en-US" altLang="ko-KR" sz="1000" dirty="0" err="1"/>
+              <a:t>iMap</a:t>
+            </a:r>
+            <a:r>
+              <a:rPr lang="en-US" altLang="ko-KR" sz="1000" dirty="0"/>
+              <a:t>)[y][x] = </a:t>
+            </a:r>
+            <a:r>
+              <a:rPr lang="en-US" altLang="ko-KR" sz="1000" dirty="0" err="1"/>
+              <a:t>saveLine</a:t>
+            </a:r>
+            <a:r>
+              <a:rPr lang="en-US" altLang="ko-KR" sz="1000" dirty="0"/>
+              <a:t>[0][x];</a:t>
+            </a:r>
+          </a:p>
+          <a:p>
+            <a:r>
+              <a:rPr lang="en-US" altLang="ko-KR" sz="1000" dirty="0"/>
+              <a:t>         </a:t>
+            </a:r>
+            <a:r>
+              <a:rPr lang="en-US" altLang="ko-KR" sz="1000" dirty="0" err="1"/>
+              <a:t>saveLine</a:t>
+            </a:r>
+            <a:r>
+              <a:rPr lang="en-US" altLang="ko-KR" sz="1000" dirty="0"/>
+              <a:t>[0][x] = </a:t>
+            </a:r>
+            <a:r>
+              <a:rPr lang="en-US" altLang="ko-KR" sz="1000" dirty="0" err="1"/>
+              <a:t>saveLine</a:t>
+            </a:r>
+            <a:r>
+              <a:rPr lang="en-US" altLang="ko-KR" sz="1000" dirty="0"/>
+              <a:t>[1][x];</a:t>
+            </a:r>
+          </a:p>
+          <a:p>
+            <a:r>
+              <a:rPr lang="en-US" altLang="ko-KR" sz="1000" dirty="0"/>
+              <a:t>      }</a:t>
+            </a:r>
+          </a:p>
+          <a:p>
+            <a:r>
+              <a:rPr lang="en-US" altLang="ko-KR" sz="1000" dirty="0"/>
+              <a:t>   }</a:t>
+            </a:r>
+          </a:p>
+          <a:p>
+            <a:r>
+              <a:rPr lang="en-US" altLang="ko-KR" sz="1000" dirty="0" smtClean="0"/>
+              <a:t>}</a:t>
+            </a:r>
+          </a:p>
+          <a:p>
+            <a:endParaRPr lang="en-US" altLang="ko-KR" sz="1000" dirty="0" smtClean="0"/>
+          </a:p>
+          <a:p>
+            <a:r>
+              <a:rPr lang="en-US" altLang="ko-KR" sz="1000" dirty="0"/>
+              <a:t>Void </a:t>
+            </a:r>
+            <a:r>
+              <a:rPr lang="en-US" altLang="ko-KR" sz="1000" dirty="0" err="1"/>
+              <a:t>DeleteLine</a:t>
+            </a:r>
+            <a:r>
+              <a:rPr lang="en-US" altLang="ko-KR" sz="1000" dirty="0"/>
+              <a:t>()</a:t>
+            </a:r>
+          </a:p>
+          <a:p>
+            <a:r>
+              <a:rPr lang="en-US" altLang="ko-KR" sz="1000" dirty="0"/>
+              <a:t>{</a:t>
+            </a:r>
+          </a:p>
+          <a:p>
+            <a:r>
+              <a:rPr lang="en-US" altLang="ko-KR" sz="1000" dirty="0"/>
+              <a:t>   for(</a:t>
+            </a:r>
+            <a:r>
+              <a:rPr lang="en-US" altLang="ko-KR" sz="1000" dirty="0" err="1"/>
+              <a:t>int</a:t>
+            </a:r>
+            <a:r>
+              <a:rPr lang="en-US" altLang="ko-KR" sz="1000" dirty="0"/>
+              <a:t> x=1; x&lt;19; x++)</a:t>
+            </a:r>
+          </a:p>
+          <a:p>
+            <a:r>
+              <a:rPr lang="en-US" altLang="ko-KR" sz="1000" dirty="0"/>
+              <a:t>   {</a:t>
+            </a:r>
+          </a:p>
+          <a:p>
+            <a:r>
+              <a:rPr lang="en-US" altLang="ko-KR" sz="1000" dirty="0"/>
+              <a:t>       (*</a:t>
+            </a:r>
+            <a:r>
+              <a:rPr lang="en-US" altLang="ko-KR" sz="1000" dirty="0" err="1"/>
+              <a:t>iMap</a:t>
+            </a:r>
+            <a:r>
+              <a:rPr lang="en-US" altLang="ko-KR" sz="1000" dirty="0"/>
+              <a:t>)[</a:t>
+            </a:r>
+            <a:r>
+              <a:rPr lang="en-US" altLang="ko-KR" sz="1000" dirty="0" err="1"/>
+              <a:t>lineNum</a:t>
+            </a:r>
+            <a:r>
+              <a:rPr lang="en-US" altLang="ko-KR" sz="1000" dirty="0"/>
+              <a:t>][x] = 0;</a:t>
+            </a:r>
+          </a:p>
+          <a:p>
+            <a:r>
+              <a:rPr lang="en-US" altLang="ko-KR" sz="1000" dirty="0"/>
+              <a:t>   }</a:t>
+            </a:r>
+          </a:p>
+          <a:p>
+            <a:r>
+              <a:rPr lang="en-US" altLang="ko-KR" sz="1000" dirty="0"/>
+              <a:t>}</a:t>
+            </a:r>
+          </a:p>
+          <a:p>
+            <a:endParaRPr lang="en-US" altLang="ko-KR" sz="1000" dirty="0"/>
+          </a:p>
+        </p:txBody>
+      </p:sp>
+      <p:sp>
+        <p:nvSpPr>
+          <p:cNvPr id="5" name="TextBox 4"/>
+          <p:cNvSpPr txBox="1"/>
+          <p:nvPr/>
+        </p:nvSpPr>
+        <p:spPr>
+          <a:xfrm>
+            <a:off x="8010474" y="-98854"/>
+            <a:ext cx="3215640" cy="6863417"/>
+          </a:xfrm>
+          <a:prstGeom prst="rect">
+            <a:avLst/>
+          </a:prstGeom>
+          <a:noFill/>
+        </p:spPr>
+        <p:txBody>
+          <a:bodyPr wrap="square" rtlCol="0">
+            <a:spAutoFit/>
+          </a:bodyPr>
+          <a:lstStyle/>
+          <a:p>
+            <a:endParaRPr lang="en-US" altLang="ko-KR" sz="1000" dirty="0" smtClean="0"/>
+          </a:p>
+          <a:p>
+            <a:r>
+              <a:rPr lang="en-US" altLang="ko-KR" sz="1000" dirty="0" smtClean="0"/>
+              <a:t>Void </a:t>
+            </a:r>
+            <a:r>
+              <a:rPr lang="en-US" altLang="ko-KR" sz="1000" dirty="0" err="1" smtClean="0"/>
+              <a:t>CreateLine</a:t>
+            </a:r>
+            <a:r>
+              <a:rPr lang="en-US" altLang="ko-KR" sz="1000" dirty="0" smtClean="0"/>
+              <a:t>()</a:t>
+            </a:r>
+          </a:p>
+          <a:p>
+            <a:r>
+              <a:rPr lang="en-US" altLang="ko-KR" sz="1000" dirty="0" smtClean="0"/>
+              <a:t>{</a:t>
+            </a:r>
+          </a:p>
+          <a:p>
+            <a:r>
+              <a:rPr lang="en-US" altLang="ko-KR" sz="1000" dirty="0"/>
+              <a:t> </a:t>
+            </a:r>
+            <a:r>
+              <a:rPr lang="en-US" altLang="ko-KR" sz="1000" dirty="0" smtClean="0"/>
+              <a:t>  </a:t>
+            </a:r>
+            <a:r>
+              <a:rPr lang="en-US" altLang="ko-KR" sz="1000" dirty="0" err="1" smtClean="0"/>
+              <a:t>srand</a:t>
+            </a:r>
+            <a:r>
+              <a:rPr lang="en-US" altLang="ko-KR" sz="1000" dirty="0" smtClean="0"/>
+              <a:t>(time(NULL</a:t>
+            </a:r>
+            <a:r>
+              <a:rPr lang="en-US" altLang="ko-KR" sz="1000" dirty="0"/>
+              <a:t>));</a:t>
+            </a:r>
+            <a:endParaRPr lang="en-US" altLang="ko-KR" sz="1000" dirty="0" smtClean="0"/>
+          </a:p>
+          <a:p>
+            <a:r>
+              <a:rPr lang="en-US" altLang="ko-KR" sz="1000" dirty="0"/>
+              <a:t> </a:t>
+            </a:r>
+            <a:r>
+              <a:rPr lang="en-US" altLang="ko-KR" sz="1000" dirty="0" smtClean="0"/>
+              <a:t>  </a:t>
+            </a:r>
+            <a:r>
+              <a:rPr lang="en-US" altLang="ko-KR" sz="1000" dirty="0" err="1" smtClean="0"/>
+              <a:t>int</a:t>
+            </a:r>
+            <a:r>
+              <a:rPr lang="en-US" altLang="ko-KR" sz="1000" dirty="0" smtClean="0"/>
+              <a:t> </a:t>
+            </a:r>
+            <a:r>
+              <a:rPr lang="en-US" altLang="ko-KR" sz="1000" dirty="0" err="1" smtClean="0"/>
+              <a:t>checkRand</a:t>
+            </a:r>
+            <a:r>
+              <a:rPr lang="en-US" altLang="ko-KR" sz="1000" dirty="0" smtClean="0"/>
+              <a:t> = rand()%2;</a:t>
+            </a:r>
+          </a:p>
+          <a:p>
+            <a:endParaRPr lang="en-US" altLang="ko-KR" sz="1000" dirty="0" smtClean="0"/>
+          </a:p>
+          <a:p>
+            <a:r>
+              <a:rPr lang="en-US" altLang="ko-KR" sz="1000" dirty="0"/>
+              <a:t> </a:t>
+            </a:r>
+            <a:r>
+              <a:rPr lang="en-US" altLang="ko-KR" sz="1000" dirty="0" smtClean="0"/>
+              <a:t>  </a:t>
+            </a:r>
+            <a:r>
+              <a:rPr lang="en-US" altLang="ko-KR" sz="1000" dirty="0" err="1" smtClean="0"/>
+              <a:t>srand</a:t>
+            </a:r>
+            <a:r>
+              <a:rPr lang="en-US" altLang="ko-KR" sz="1000" dirty="0" smtClean="0"/>
+              <a:t>(time(NULL</a:t>
+            </a:r>
+            <a:r>
+              <a:rPr lang="en-US" altLang="ko-KR" sz="1000" dirty="0"/>
+              <a:t>));</a:t>
+            </a:r>
+            <a:endParaRPr lang="en-US" altLang="ko-KR" sz="1000" dirty="0" smtClean="0"/>
+          </a:p>
+          <a:p>
+            <a:r>
+              <a:rPr lang="en-US" altLang="ko-KR" sz="1000" dirty="0"/>
+              <a:t> </a:t>
+            </a:r>
+            <a:r>
+              <a:rPr lang="en-US" altLang="ko-KR" sz="1000" dirty="0" smtClean="0"/>
+              <a:t>  </a:t>
+            </a:r>
+            <a:r>
+              <a:rPr lang="en-US" altLang="ko-KR" sz="1000" dirty="0" err="1" smtClean="0"/>
+              <a:t>int</a:t>
+            </a:r>
+            <a:r>
+              <a:rPr lang="en-US" altLang="ko-KR" sz="1000" dirty="0" smtClean="0"/>
+              <a:t> </a:t>
+            </a:r>
+            <a:r>
+              <a:rPr lang="en-US" altLang="ko-KR" sz="1000" dirty="0" err="1" smtClean="0"/>
+              <a:t>firstRand</a:t>
+            </a:r>
+            <a:r>
+              <a:rPr lang="en-US" altLang="ko-KR" sz="1000" dirty="0" smtClean="0"/>
+              <a:t> = rand()%18;</a:t>
+            </a:r>
+          </a:p>
+          <a:p>
+            <a:endParaRPr lang="en-US" altLang="ko-KR" sz="1000" dirty="0" smtClean="0"/>
+          </a:p>
+          <a:p>
+            <a:r>
               <a:rPr lang="en-US" altLang="ko-KR" sz="1000" dirty="0" smtClean="0"/>
               <a:t>   </a:t>
             </a:r>
+            <a:r>
+              <a:rPr lang="en-US" altLang="ko-KR" sz="1000" dirty="0" err="1" smtClean="0"/>
+              <a:t>srand</a:t>
+            </a:r>
+            <a:r>
+              <a:rPr lang="en-US" altLang="ko-KR" sz="1000" dirty="0" smtClean="0"/>
+              <a:t>(time(NULL));</a:t>
+            </a:r>
             <a:endParaRPr lang="en-US" altLang="ko-KR" sz="1000" dirty="0"/>
           </a:p>
           <a:p>
             <a:r>
+              <a:rPr lang="en-US" altLang="ko-KR" sz="1000" dirty="0"/>
+              <a:t> </a:t>
+            </a:r>
+            <a:r>
+              <a:rPr lang="en-US" altLang="ko-KR" sz="1000" dirty="0" smtClean="0"/>
+              <a:t>  </a:t>
+            </a:r>
+            <a:r>
+              <a:rPr lang="en-US" altLang="ko-KR" sz="1000" dirty="0" err="1" smtClean="0"/>
+              <a:t>int</a:t>
+            </a:r>
+            <a:r>
+              <a:rPr lang="en-US" altLang="ko-KR" sz="1000" dirty="0" smtClean="0"/>
+              <a:t> </a:t>
+            </a:r>
+            <a:r>
+              <a:rPr lang="en-US" altLang="ko-KR" sz="1000" dirty="0" err="1" smtClean="0"/>
+              <a:t>secondRand</a:t>
+            </a:r>
+            <a:r>
+              <a:rPr lang="en-US" altLang="ko-KR" sz="1000" dirty="0" smtClean="0"/>
+              <a:t> </a:t>
+            </a:r>
+            <a:r>
+              <a:rPr lang="en-US" altLang="ko-KR" sz="1000" dirty="0"/>
+              <a:t>= rand()%18;</a:t>
+            </a:r>
+          </a:p>
+          <a:p>
+            <a:endParaRPr lang="en-US" altLang="ko-KR" sz="1000" dirty="0" smtClean="0"/>
+          </a:p>
+          <a:p>
+            <a:r>
+              <a:rPr lang="en-US" altLang="ko-KR" sz="1000" dirty="0" smtClean="0"/>
+              <a:t>   </a:t>
+            </a:r>
+            <a:r>
+              <a:rPr lang="en-US" altLang="ko-KR" sz="1000" dirty="0" err="1" smtClean="0"/>
+              <a:t>MoveLineUp</a:t>
+            </a:r>
+            <a:r>
+              <a:rPr lang="en-US" altLang="ko-KR" sz="1000" dirty="0" smtClean="0"/>
+              <a:t>();</a:t>
+            </a:r>
+          </a:p>
+          <a:p>
+            <a:r>
+              <a:rPr lang="en-US" altLang="ko-KR" sz="1000" dirty="0"/>
+              <a:t> </a:t>
+            </a:r>
+            <a:r>
+              <a:rPr lang="en-US" altLang="ko-KR" sz="1000" dirty="0" smtClean="0"/>
+              <a:t>  </a:t>
+            </a:r>
+          </a:p>
+          <a:p>
+            <a:r>
+              <a:rPr lang="en-US" altLang="ko-KR" sz="1000" dirty="0"/>
+              <a:t> </a:t>
+            </a:r>
+            <a:r>
+              <a:rPr lang="en-US" altLang="ko-KR" sz="1000" dirty="0" smtClean="0"/>
+              <a:t>  for(</a:t>
+            </a:r>
+            <a:r>
+              <a:rPr lang="en-US" altLang="ko-KR" sz="1000" dirty="0" err="1" smtClean="0"/>
+              <a:t>int</a:t>
+            </a:r>
+            <a:r>
+              <a:rPr lang="en-US" altLang="ko-KR" sz="1000" dirty="0" smtClean="0"/>
+              <a:t> x=1 x&lt;19; x++)</a:t>
+            </a:r>
+          </a:p>
+          <a:p>
+            <a:r>
+              <a:rPr lang="en-US" altLang="ko-KR" sz="1000" dirty="0"/>
+              <a:t> </a:t>
+            </a:r>
+            <a:r>
+              <a:rPr lang="en-US" altLang="ko-KR" sz="1000" dirty="0" smtClean="0"/>
+              <a:t>  {</a:t>
+            </a:r>
+          </a:p>
+          <a:p>
+            <a:r>
+              <a:rPr lang="en-US" altLang="ko-KR" sz="1000" dirty="0"/>
+              <a:t> </a:t>
+            </a:r>
+            <a:r>
+              <a:rPr lang="en-US" altLang="ko-KR" sz="1000" dirty="0" smtClean="0"/>
+              <a:t>     if(</a:t>
+            </a:r>
+            <a:r>
+              <a:rPr lang="en-US" altLang="ko-KR" sz="1000" dirty="0" err="1" smtClean="0"/>
+              <a:t>checkRand</a:t>
+            </a:r>
+            <a:r>
+              <a:rPr lang="en-US" altLang="ko-KR" sz="1000" dirty="0" smtClean="0"/>
+              <a:t> == 0)</a:t>
+            </a:r>
+          </a:p>
+          <a:p>
+            <a:r>
+              <a:rPr lang="en-US" altLang="ko-KR" sz="1000" dirty="0"/>
+              <a:t> </a:t>
+            </a:r>
+            <a:r>
+              <a:rPr lang="en-US" altLang="ko-KR" sz="1000" dirty="0" smtClean="0"/>
+              <a:t>     {</a:t>
+            </a:r>
+          </a:p>
+          <a:p>
+            <a:r>
+              <a:rPr lang="en-US" altLang="ko-KR" sz="1000" dirty="0"/>
+              <a:t> </a:t>
+            </a:r>
+            <a:r>
+              <a:rPr lang="en-US" altLang="ko-KR" sz="1000" dirty="0" smtClean="0"/>
+              <a:t>        if(x == </a:t>
+            </a:r>
+            <a:r>
+              <a:rPr lang="en-US" altLang="ko-KR" sz="1000" dirty="0" err="1" smtClean="0"/>
+              <a:t>firstRand</a:t>
+            </a:r>
+            <a:r>
+              <a:rPr lang="en-US" altLang="ko-KR" sz="1000" dirty="0" smtClean="0"/>
+              <a:t>)</a:t>
+            </a:r>
+          </a:p>
+          <a:p>
+            <a:r>
+              <a:rPr lang="en-US" altLang="ko-KR" sz="1000" dirty="0"/>
+              <a:t> </a:t>
+            </a:r>
+            <a:r>
+              <a:rPr lang="en-US" altLang="ko-KR" sz="1000" dirty="0" smtClean="0"/>
+              <a:t>        {</a:t>
+            </a:r>
+          </a:p>
+          <a:p>
+            <a:r>
+              <a:rPr lang="en-US" altLang="ko-KR" sz="1000" dirty="0" smtClean="0"/>
+              <a:t>            (*</a:t>
+            </a:r>
+            <a:r>
+              <a:rPr lang="en-US" altLang="ko-KR" sz="1000" dirty="0" err="1" smtClean="0"/>
+              <a:t>iMap</a:t>
+            </a:r>
+            <a:r>
+              <a:rPr lang="en-US" altLang="ko-KR" sz="1000" dirty="0" smtClean="0"/>
+              <a:t>)[38][x] = 0;</a:t>
+            </a:r>
+          </a:p>
+          <a:p>
+            <a:r>
+              <a:rPr lang="en-US" altLang="ko-KR" sz="1000" dirty="0"/>
+              <a:t> </a:t>
+            </a:r>
+            <a:r>
+              <a:rPr lang="en-US" altLang="ko-KR" sz="1000" dirty="0" smtClean="0"/>
+              <a:t>        }</a:t>
+            </a:r>
+          </a:p>
+          <a:p>
+            <a:r>
+              <a:rPr lang="en-US" altLang="ko-KR" sz="1000" dirty="0"/>
+              <a:t> </a:t>
+            </a:r>
+            <a:r>
+              <a:rPr lang="en-US" altLang="ko-KR" sz="1000" dirty="0" smtClean="0"/>
+              <a:t>        else</a:t>
+            </a:r>
+          </a:p>
+          <a:p>
+            <a:r>
+              <a:rPr lang="en-US" altLang="ko-KR" sz="1000" dirty="0"/>
+              <a:t> </a:t>
+            </a:r>
+            <a:r>
+              <a:rPr lang="en-US" altLang="ko-KR" sz="1000" dirty="0" smtClean="0"/>
+              <a:t>        {</a:t>
+            </a:r>
+          </a:p>
+          <a:p>
+            <a:r>
+              <a:rPr lang="en-US" altLang="ko-KR" sz="1000" dirty="0"/>
+              <a:t>  </a:t>
+            </a:r>
+            <a:r>
+              <a:rPr lang="en-US" altLang="ko-KR" sz="1000" dirty="0" smtClean="0"/>
+              <a:t>          (*</a:t>
+            </a:r>
+            <a:r>
+              <a:rPr lang="en-US" altLang="ko-KR" sz="1000" dirty="0" err="1"/>
+              <a:t>iMap</a:t>
+            </a:r>
+            <a:r>
+              <a:rPr lang="en-US" altLang="ko-KR" sz="1000" dirty="0"/>
+              <a:t>)[38</a:t>
+            </a:r>
+            <a:r>
+              <a:rPr lang="en-US" altLang="ko-KR" sz="1000" dirty="0" smtClean="0"/>
+              <a:t>][x] </a:t>
+            </a:r>
+            <a:r>
+              <a:rPr lang="en-US" altLang="ko-KR" sz="1000" dirty="0"/>
+              <a:t>= </a:t>
+            </a:r>
+            <a:r>
+              <a:rPr lang="en-US" altLang="ko-KR" sz="1000" dirty="0" smtClean="0"/>
+              <a:t>1;         </a:t>
+            </a:r>
+          </a:p>
+          <a:p>
+            <a:r>
+              <a:rPr lang="en-US" altLang="ko-KR" sz="1000" dirty="0"/>
+              <a:t> </a:t>
+            </a:r>
+            <a:r>
+              <a:rPr lang="en-US" altLang="ko-KR" sz="1000" dirty="0" smtClean="0"/>
+              <a:t>        }</a:t>
+            </a:r>
+          </a:p>
+          <a:p>
+            <a:r>
+              <a:rPr lang="en-US" altLang="ko-KR" sz="1000" dirty="0"/>
+              <a:t> </a:t>
+            </a:r>
+            <a:r>
+              <a:rPr lang="en-US" altLang="ko-KR" sz="1000" dirty="0" smtClean="0"/>
+              <a:t>     }</a:t>
+            </a:r>
+          </a:p>
+          <a:p>
+            <a:r>
+              <a:rPr lang="en-US" altLang="ko-KR" sz="1000" dirty="0"/>
+              <a:t> </a:t>
+            </a:r>
+            <a:r>
+              <a:rPr lang="en-US" altLang="ko-KR" sz="1000" dirty="0" smtClean="0"/>
+              <a:t>     else if(</a:t>
+            </a:r>
+            <a:r>
+              <a:rPr lang="en-US" altLang="ko-KR" sz="1000" dirty="0" err="1" smtClean="0"/>
+              <a:t>checkRand</a:t>
+            </a:r>
+            <a:r>
+              <a:rPr lang="en-US" altLang="ko-KR" sz="1000" dirty="0" smtClean="0"/>
+              <a:t> == 1)</a:t>
+            </a:r>
+          </a:p>
+          <a:p>
+            <a:r>
+              <a:rPr lang="en-US" altLang="ko-KR" sz="1000" dirty="0"/>
+              <a:t> </a:t>
+            </a:r>
+            <a:r>
+              <a:rPr lang="en-US" altLang="ko-KR" sz="1000" dirty="0" smtClean="0"/>
+              <a:t>     {</a:t>
+            </a:r>
+          </a:p>
+          <a:p>
+            <a:r>
+              <a:rPr lang="en-US" altLang="ko-KR" sz="1000" dirty="0" smtClean="0"/>
+              <a:t>         </a:t>
+            </a:r>
+            <a:r>
+              <a:rPr lang="en-US" altLang="ko-KR" sz="1000" dirty="0"/>
+              <a:t>if(x == </a:t>
+            </a:r>
+            <a:r>
+              <a:rPr lang="en-US" altLang="ko-KR" sz="1000" dirty="0" err="1"/>
+              <a:t>firstRand</a:t>
+            </a:r>
+            <a:r>
+              <a:rPr lang="en-US" altLang="ko-KR" sz="1000" dirty="0"/>
+              <a:t>)</a:t>
+            </a:r>
+          </a:p>
+          <a:p>
+            <a:r>
+              <a:rPr lang="en-US" altLang="ko-KR" sz="1000" dirty="0"/>
+              <a:t>         {</a:t>
+            </a:r>
+          </a:p>
+          <a:p>
+            <a:r>
+              <a:rPr lang="en-US" altLang="ko-KR" sz="1000" dirty="0"/>
+              <a:t>            (*</a:t>
+            </a:r>
+            <a:r>
+              <a:rPr lang="en-US" altLang="ko-KR" sz="1000" dirty="0" err="1"/>
+              <a:t>iMap</a:t>
+            </a:r>
+            <a:r>
+              <a:rPr lang="en-US" altLang="ko-KR" sz="1000" dirty="0"/>
+              <a:t>)[38][x] = 0;</a:t>
+            </a:r>
+          </a:p>
+          <a:p>
+            <a:r>
+              <a:rPr lang="en-US" altLang="ko-KR" sz="1000" dirty="0"/>
+              <a:t>         </a:t>
+            </a:r>
+            <a:r>
               <a:rPr lang="en-US" altLang="ko-KR" sz="1000" dirty="0" smtClean="0"/>
               <a:t>}</a:t>
             </a:r>
           </a:p>
           <a:p>
+            <a:r>
+              <a:rPr lang="en-US" altLang="ko-KR" sz="1000" dirty="0" smtClean="0"/>
+              <a:t>         else if(x </a:t>
+            </a:r>
+            <a:r>
+              <a:rPr lang="en-US" altLang="ko-KR" sz="1000" dirty="0"/>
+              <a:t>== </a:t>
+            </a:r>
+            <a:r>
+              <a:rPr lang="en-US" altLang="ko-KR" sz="1000" dirty="0" err="1" smtClean="0"/>
+              <a:t>secondRand</a:t>
+            </a:r>
+            <a:r>
+              <a:rPr lang="en-US" altLang="ko-KR" sz="1000" dirty="0" smtClean="0"/>
+              <a:t>)</a:t>
+            </a:r>
+            <a:endParaRPr lang="en-US" altLang="ko-KR" sz="1000" dirty="0"/>
+          </a:p>
+          <a:p>
+            <a:r>
+              <a:rPr lang="en-US" altLang="ko-KR" sz="1000" dirty="0"/>
+              <a:t>         {</a:t>
+            </a:r>
+          </a:p>
+          <a:p>
+            <a:r>
+              <a:rPr lang="en-US" altLang="ko-KR" sz="1000" dirty="0"/>
+              <a:t>            (*</a:t>
+            </a:r>
+            <a:r>
+              <a:rPr lang="en-US" altLang="ko-KR" sz="1000" dirty="0" err="1"/>
+              <a:t>iMap</a:t>
+            </a:r>
+            <a:r>
+              <a:rPr lang="en-US" altLang="ko-KR" sz="1000" dirty="0"/>
+              <a:t>)[38][x] = 0;</a:t>
+            </a:r>
+          </a:p>
+          <a:p>
+            <a:r>
+              <a:rPr lang="en-US" altLang="ko-KR" sz="1000" dirty="0"/>
+              <a:t>         }</a:t>
+            </a:r>
+          </a:p>
+          <a:p>
+            <a:r>
+              <a:rPr lang="en-US" altLang="ko-KR" sz="1000" dirty="0"/>
+              <a:t>         else</a:t>
+            </a:r>
+          </a:p>
+          <a:p>
+            <a:r>
+              <a:rPr lang="en-US" altLang="ko-KR" sz="1000" dirty="0"/>
+              <a:t>         {</a:t>
+            </a:r>
+          </a:p>
+          <a:p>
+            <a:r>
+              <a:rPr lang="en-US" altLang="ko-KR" sz="1000" dirty="0"/>
+              <a:t>            (*</a:t>
+            </a:r>
+            <a:r>
+              <a:rPr lang="en-US" altLang="ko-KR" sz="1000" dirty="0" err="1"/>
+              <a:t>iMap</a:t>
+            </a:r>
+            <a:r>
+              <a:rPr lang="en-US" altLang="ko-KR" sz="1000" dirty="0"/>
+              <a:t>)[38][x] = 1;         </a:t>
+            </a:r>
+          </a:p>
+          <a:p>
+            <a:r>
+              <a:rPr lang="en-US" altLang="ko-KR" sz="1000" dirty="0"/>
+              <a:t>         }</a:t>
+            </a:r>
+            <a:endParaRPr lang="en-US" altLang="ko-KR" sz="1000" dirty="0" smtClean="0"/>
+          </a:p>
+          <a:p>
+            <a:r>
+              <a:rPr lang="en-US" altLang="ko-KR" sz="1000" dirty="0"/>
+              <a:t> </a:t>
+            </a:r>
+            <a:r>
+              <a:rPr lang="en-US" altLang="ko-KR" sz="1000" dirty="0" smtClean="0"/>
+              <a:t>     }</a:t>
+            </a:r>
+          </a:p>
+          <a:p>
+            <a:r>
+              <a:rPr lang="en-US" altLang="ko-KR" sz="1000" dirty="0"/>
+              <a:t> </a:t>
+            </a:r>
+            <a:r>
+              <a:rPr lang="en-US" altLang="ko-KR" sz="1000" dirty="0" smtClean="0"/>
+              <a:t>  }</a:t>
+            </a:r>
+            <a:endParaRPr lang="en-US" altLang="ko-KR" sz="1000" dirty="0"/>
+          </a:p>
+          <a:p>
+            <a:r>
+              <a:rPr lang="en-US" altLang="ko-KR" sz="1000" dirty="0" smtClean="0"/>
+              <a:t>}</a:t>
+            </a:r>
             <a:endParaRPr lang="en-US" altLang="ko-KR" sz="1000" dirty="0"/>
           </a:p>
         </p:txBody>
@@ -7330,8 +8439,8 @@
         </p:nvSpPr>
         <p:spPr>
           <a:xfrm>
-            <a:off x="337751" y="230658"/>
-            <a:ext cx="6293708" cy="1477328"/>
+            <a:off x="90616" y="65901"/>
+            <a:ext cx="6293708" cy="3016210"/>
           </a:xfrm>
           <a:prstGeom prst="rect">
             <a:avLst/>
@@ -7345,28 +8454,682 @@
           <a:lstStyle/>
           <a:p>
             <a:r>
-              <a:rPr lang="en-US" altLang="ko-KR" dirty="0" smtClean="0"/>
+              <a:rPr lang="en-US" altLang="ko-KR" sz="1000" dirty="0" smtClean="0"/>
+              <a:t>Static HANDLE </a:t>
+            </a:r>
+            <a:r>
+              <a:rPr lang="en-US" altLang="ko-KR" sz="1000" dirty="0" err="1" smtClean="0"/>
+              <a:t>hBuffer</a:t>
+            </a:r>
+            <a:r>
+              <a:rPr lang="en-US" altLang="ko-KR" sz="1000" dirty="0" smtClean="0"/>
+              <a:t>[2];</a:t>
+            </a:r>
+            <a:endParaRPr lang="en-US" altLang="ko-KR" sz="1000" dirty="0"/>
+          </a:p>
+          <a:p>
+            <a:endParaRPr lang="en-US" altLang="ko-KR" sz="1000" dirty="0" smtClean="0"/>
+          </a:p>
+          <a:p>
+            <a:r>
+              <a:rPr lang="en-US" altLang="ko-KR" sz="1000" dirty="0" smtClean="0"/>
               <a:t>Class Map</a:t>
             </a:r>
           </a:p>
           <a:p>
             <a:r>
-              <a:rPr lang="en-US" altLang="ko-KR" dirty="0" smtClean="0"/>
+              <a:rPr lang="en-US" altLang="ko-KR" sz="1000" dirty="0" smtClean="0"/>
               <a:t>{</a:t>
             </a:r>
           </a:p>
           <a:p>
-            <a:endParaRPr lang="en-US" altLang="ko-KR" dirty="0" smtClean="0"/>
-          </a:p>
-          <a:p>
-            <a:endParaRPr lang="en-US" altLang="ko-KR" dirty="0"/>
-          </a:p>
-          <a:p>
-            <a:r>
-              <a:rPr lang="en-US" altLang="ko-KR" dirty="0" smtClean="0"/>
+            <a:r>
+              <a:rPr lang="en-US" altLang="ko-KR" sz="1000" dirty="0" smtClean="0"/>
+              <a:t>  private:</a:t>
+            </a:r>
+          </a:p>
+          <a:p>
+            <a:r>
+              <a:rPr lang="en-US" altLang="ko-KR" sz="1000" dirty="0"/>
+              <a:t> </a:t>
+            </a:r>
+            <a:r>
+              <a:rPr lang="en-US" altLang="ko-KR" sz="1000" dirty="0" smtClean="0"/>
+              <a:t>   </a:t>
+            </a:r>
+            <a:r>
+              <a:rPr lang="en-US" altLang="ko-KR" sz="1000" dirty="0"/>
+              <a:t> </a:t>
+            </a:r>
+            <a:r>
+              <a:rPr lang="en-US" altLang="ko-KR" sz="1000" dirty="0" err="1" smtClean="0"/>
+              <a:t>int</a:t>
+            </a:r>
+            <a:r>
+              <a:rPr lang="en-US" altLang="ko-KR" sz="1000" dirty="0" smtClean="0"/>
+              <a:t> </a:t>
+            </a:r>
+            <a:r>
+              <a:rPr lang="en-US" altLang="ko-KR" sz="1000" dirty="0" err="1" smtClean="0"/>
+              <a:t>nScreenIndex</a:t>
+            </a:r>
+            <a:r>
+              <a:rPr lang="en-US" altLang="ko-KR" sz="1000" dirty="0" smtClean="0"/>
+              <a:t>;</a:t>
+            </a:r>
+          </a:p>
+          <a:p>
+            <a:r>
+              <a:rPr lang="en-US" altLang="ko-KR" sz="1000" dirty="0" smtClean="0"/>
+              <a:t>     </a:t>
+            </a:r>
+          </a:p>
+          <a:p>
+            <a:r>
+              <a:rPr lang="en-US" altLang="ko-KR" sz="1000" dirty="0"/>
+              <a:t> </a:t>
+            </a:r>
+            <a:r>
+              <a:rPr lang="en-US" altLang="ko-KR" sz="1000" dirty="0" smtClean="0"/>
+              <a:t> public:</a:t>
+            </a:r>
+          </a:p>
+          <a:p>
+            <a:r>
+              <a:rPr lang="en-US" altLang="ko-KR" sz="1000" dirty="0" smtClean="0"/>
+              <a:t>    </a:t>
+            </a:r>
+            <a:r>
+              <a:rPr lang="en-US" altLang="ko-KR" sz="1000" dirty="0" err="1" smtClean="0"/>
+              <a:t>int</a:t>
+            </a:r>
+            <a:r>
+              <a:rPr lang="en-US" altLang="ko-KR" sz="1000" dirty="0" smtClean="0"/>
+              <a:t> </a:t>
+            </a:r>
+            <a:r>
+              <a:rPr lang="en-US" altLang="ko-KR" sz="1000" dirty="0"/>
+              <a:t>map[40][20</a:t>
+            </a:r>
+            <a:r>
+              <a:rPr lang="en-US" altLang="ko-KR" sz="1000" dirty="0" smtClean="0"/>
+              <a:t>];</a:t>
+            </a:r>
+          </a:p>
+          <a:p>
+            <a:r>
+              <a:rPr lang="en-US" altLang="ko-KR" sz="1000" dirty="0" smtClean="0"/>
+              <a:t>    Map();</a:t>
+            </a:r>
+          </a:p>
+          <a:p>
+            <a:r>
+              <a:rPr lang="en-US" altLang="ko-KR" sz="1000" dirty="0"/>
+              <a:t> </a:t>
+            </a:r>
+            <a:r>
+              <a:rPr lang="en-US" altLang="ko-KR" sz="1000" dirty="0" smtClean="0"/>
+              <a:t>   void </a:t>
+            </a:r>
+            <a:r>
+              <a:rPr lang="en-US" altLang="ko-KR" sz="1000" dirty="0" err="1" smtClean="0"/>
+              <a:t>UpdateMap</a:t>
+            </a:r>
+            <a:r>
+              <a:rPr lang="en-US" altLang="ko-KR" sz="1000" dirty="0" smtClean="0"/>
+              <a:t>();</a:t>
+            </a:r>
+          </a:p>
+          <a:p>
+            <a:r>
+              <a:rPr lang="en-US" altLang="ko-KR" sz="1000" dirty="0"/>
+              <a:t> </a:t>
+            </a:r>
+            <a:r>
+              <a:rPr lang="en-US" altLang="ko-KR" sz="1000" dirty="0" smtClean="0"/>
+              <a:t>    </a:t>
+            </a:r>
+          </a:p>
+          <a:p>
+            <a:r>
+              <a:rPr lang="en-US" altLang="ko-KR" sz="1000" dirty="0"/>
+              <a:t> </a:t>
+            </a:r>
+            <a:r>
+              <a:rPr lang="en-US" altLang="ko-KR" sz="1000" dirty="0" smtClean="0"/>
+              <a:t>   //</a:t>
+            </a:r>
+            <a:r>
+              <a:rPr lang="ko-KR" altLang="en-US" sz="1000" dirty="0" smtClean="0"/>
+              <a:t>세부내용 생략</a:t>
+            </a:r>
+            <a:endParaRPr lang="en-US" altLang="ko-KR" sz="1000" dirty="0" smtClean="0"/>
+          </a:p>
+          <a:p>
+            <a:r>
+              <a:rPr lang="en-US" altLang="ko-KR" sz="1000" dirty="0" smtClean="0"/>
+              <a:t>    void </a:t>
+            </a:r>
+            <a:r>
+              <a:rPr lang="en-US" altLang="ko-KR" sz="1000" dirty="0" err="1"/>
+              <a:t>CreateBuffer</a:t>
+            </a:r>
+            <a:r>
+              <a:rPr lang="en-US" altLang="ko-KR" sz="1000" dirty="0"/>
+              <a:t>(); </a:t>
+            </a:r>
+            <a:endParaRPr lang="ko-KR" altLang="en-US" sz="1000" dirty="0"/>
+          </a:p>
+          <a:p>
+            <a:r>
+              <a:rPr lang="en-US" altLang="ko-KR" sz="1000" dirty="0" smtClean="0"/>
+              <a:t>    void </a:t>
+            </a:r>
+            <a:r>
+              <a:rPr lang="en-US" altLang="ko-KR" sz="1000" dirty="0" err="1"/>
+              <a:t>WriteBuffer</a:t>
+            </a:r>
+            <a:r>
+              <a:rPr lang="en-US" altLang="ko-KR" sz="1000" dirty="0"/>
+              <a:t>(</a:t>
+            </a:r>
+            <a:r>
+              <a:rPr lang="en-US" altLang="ko-KR" sz="1000" dirty="0" err="1"/>
+              <a:t>int</a:t>
+            </a:r>
+            <a:r>
+              <a:rPr lang="en-US" altLang="ko-KR" sz="1000" dirty="0"/>
+              <a:t> x, </a:t>
+            </a:r>
+            <a:r>
+              <a:rPr lang="en-US" altLang="ko-KR" sz="1000" dirty="0" err="1"/>
+              <a:t>int</a:t>
+            </a:r>
+            <a:r>
+              <a:rPr lang="en-US" altLang="ko-KR" sz="1000" dirty="0"/>
+              <a:t> y, </a:t>
+            </a:r>
+            <a:r>
+              <a:rPr lang="en-US" altLang="ko-KR" sz="1000" dirty="0" err="1"/>
+              <a:t>const</a:t>
+            </a:r>
+            <a:r>
+              <a:rPr lang="en-US" altLang="ko-KR" sz="1000" dirty="0"/>
+              <a:t> char </a:t>
+            </a:r>
+            <a:r>
+              <a:rPr lang="en-US" altLang="ko-KR" sz="1000" dirty="0" err="1"/>
+              <a:t>str</a:t>
+            </a:r>
+            <a:r>
+              <a:rPr lang="en-US" altLang="ko-KR" sz="1000" dirty="0"/>
+              <a:t>[]); </a:t>
+            </a:r>
+          </a:p>
+          <a:p>
+            <a:r>
+              <a:rPr lang="en-US" altLang="ko-KR" sz="1000" dirty="0" smtClean="0"/>
+              <a:t>    void </a:t>
+            </a:r>
+            <a:r>
+              <a:rPr lang="en-US" altLang="ko-KR" sz="1000" dirty="0" err="1"/>
+              <a:t>FlippingBuffer</a:t>
+            </a:r>
+            <a:r>
+              <a:rPr lang="en-US" altLang="ko-KR" sz="1000" dirty="0"/>
+              <a:t>(); </a:t>
+            </a:r>
+            <a:endParaRPr lang="en-US" altLang="ko-KR" sz="1000" dirty="0" smtClean="0"/>
+          </a:p>
+          <a:p>
+            <a:r>
+              <a:rPr lang="en-US" altLang="ko-KR" sz="1000" dirty="0" smtClean="0"/>
+              <a:t>    void </a:t>
+            </a:r>
+            <a:r>
+              <a:rPr lang="en-US" altLang="ko-KR" sz="1000" dirty="0" err="1"/>
+              <a:t>ClearBuffer</a:t>
+            </a:r>
+            <a:r>
+              <a:rPr lang="en-US" altLang="ko-KR" sz="1000" dirty="0"/>
+              <a:t>(); </a:t>
+            </a:r>
+            <a:endParaRPr lang="en-US" altLang="ko-KR" sz="1000" dirty="0" smtClean="0"/>
+          </a:p>
+          <a:p>
+            <a:r>
+              <a:rPr lang="en-US" altLang="ko-KR" sz="1000" dirty="0" smtClean="0"/>
+              <a:t>    void </a:t>
+            </a:r>
+            <a:r>
+              <a:rPr lang="en-US" altLang="ko-KR" sz="1000" dirty="0" err="1"/>
+              <a:t>DeleteBuffer</a:t>
+            </a:r>
+            <a:r>
+              <a:rPr lang="en-US" altLang="ko-KR" sz="1000" dirty="0" smtClean="0"/>
+              <a:t>();</a:t>
+            </a:r>
+          </a:p>
+          <a:p>
+            <a:r>
+              <a:rPr lang="en-US" altLang="ko-KR" sz="1000" dirty="0"/>
               <a:t>}</a:t>
             </a:r>
-            <a:endParaRPr lang="ko-KR" altLang="en-US" dirty="0"/>
+            <a:endParaRPr lang="ko-KR" altLang="en-US" sz="1000" dirty="0"/>
+          </a:p>
+        </p:txBody>
+      </p:sp>
+      <p:sp>
+        <p:nvSpPr>
+          <p:cNvPr id="3" name="TextBox 2"/>
+          <p:cNvSpPr txBox="1"/>
+          <p:nvPr/>
+        </p:nvSpPr>
+        <p:spPr>
+          <a:xfrm>
+            <a:off x="3134497" y="65901"/>
+            <a:ext cx="6293708" cy="5786199"/>
+          </a:xfrm>
+          <a:prstGeom prst="rect">
+            <a:avLst/>
+          </a:prstGeom>
+          <a:noFill/>
+        </p:spPr>
+        <p:txBody>
+          <a:bodyPr wrap="square" rtlCol="0">
+            <a:spAutoFit/>
+          </a:bodyPr>
+          <a:lstStyle/>
+          <a:p>
+            <a:r>
+              <a:rPr lang="en-US" altLang="ko-KR" sz="1000" dirty="0" smtClean="0"/>
+              <a:t>Map::Map()</a:t>
+            </a:r>
+          </a:p>
+          <a:p>
+            <a:r>
+              <a:rPr lang="en-US" altLang="ko-KR" sz="1000" dirty="0" smtClean="0"/>
+              <a:t>{</a:t>
+            </a:r>
+          </a:p>
+          <a:p>
+            <a:r>
+              <a:rPr lang="en-US" altLang="ko-KR" sz="1000" dirty="0" smtClean="0"/>
+              <a:t>   for(</a:t>
+            </a:r>
+            <a:r>
+              <a:rPr lang="en-US" altLang="ko-KR" sz="1000" dirty="0" err="1" smtClean="0"/>
+              <a:t>int</a:t>
+            </a:r>
+            <a:r>
+              <a:rPr lang="en-US" altLang="ko-KR" sz="1000" dirty="0" smtClean="0"/>
+              <a:t> y=0; y&lt;40; y++)</a:t>
+            </a:r>
+          </a:p>
+          <a:p>
+            <a:r>
+              <a:rPr lang="en-US" altLang="ko-KR" sz="1000" dirty="0"/>
+              <a:t> </a:t>
+            </a:r>
+            <a:r>
+              <a:rPr lang="en-US" altLang="ko-KR" sz="1000" dirty="0" smtClean="0"/>
+              <a:t>  {</a:t>
+            </a:r>
+          </a:p>
+          <a:p>
+            <a:r>
+              <a:rPr lang="en-US" altLang="ko-KR" sz="1000" dirty="0"/>
+              <a:t> </a:t>
+            </a:r>
+            <a:r>
+              <a:rPr lang="en-US" altLang="ko-KR" sz="1000" dirty="0" smtClean="0"/>
+              <a:t>     for(</a:t>
+            </a:r>
+            <a:r>
+              <a:rPr lang="en-US" altLang="ko-KR" sz="1000" dirty="0" err="1" smtClean="0"/>
+              <a:t>int</a:t>
+            </a:r>
+            <a:r>
+              <a:rPr lang="en-US" altLang="ko-KR" sz="1000" dirty="0" smtClean="0"/>
+              <a:t> x=0; x&lt;20; x++)</a:t>
+            </a:r>
+          </a:p>
+          <a:p>
+            <a:r>
+              <a:rPr lang="en-US" altLang="ko-KR" sz="1000" dirty="0"/>
+              <a:t> </a:t>
+            </a:r>
+            <a:r>
+              <a:rPr lang="en-US" altLang="ko-KR" sz="1000" dirty="0" smtClean="0"/>
+              <a:t>     {</a:t>
+            </a:r>
+          </a:p>
+          <a:p>
+            <a:r>
+              <a:rPr lang="en-US" altLang="ko-KR" sz="1000" dirty="0"/>
+              <a:t> </a:t>
+            </a:r>
+            <a:r>
+              <a:rPr lang="en-US" altLang="ko-KR" sz="1000" dirty="0" smtClean="0"/>
+              <a:t>        if(y==0 || y==39)</a:t>
+            </a:r>
+          </a:p>
+          <a:p>
+            <a:r>
+              <a:rPr lang="en-US" altLang="ko-KR" sz="1000" dirty="0"/>
+              <a:t> </a:t>
+            </a:r>
+            <a:r>
+              <a:rPr lang="en-US" altLang="ko-KR" sz="1000" dirty="0" smtClean="0"/>
+              <a:t>        {</a:t>
+            </a:r>
+          </a:p>
+          <a:p>
+            <a:r>
+              <a:rPr lang="en-US" altLang="ko-KR" sz="1000" dirty="0"/>
+              <a:t> </a:t>
+            </a:r>
+            <a:r>
+              <a:rPr lang="en-US" altLang="ko-KR" sz="1000" dirty="0" smtClean="0"/>
+              <a:t>           map[y][x] = 1;</a:t>
+            </a:r>
+          </a:p>
+          <a:p>
+            <a:r>
+              <a:rPr lang="en-US" altLang="ko-KR" sz="1000" dirty="0" smtClean="0"/>
+              <a:t>         }</a:t>
+            </a:r>
+          </a:p>
+          <a:p>
+            <a:r>
+              <a:rPr lang="en-US" altLang="ko-KR" sz="1000" dirty="0"/>
+              <a:t> </a:t>
+            </a:r>
+            <a:r>
+              <a:rPr lang="en-US" altLang="ko-KR" sz="1000" dirty="0" smtClean="0"/>
+              <a:t>        if(x == 0 || x == 19)</a:t>
+            </a:r>
+          </a:p>
+          <a:p>
+            <a:r>
+              <a:rPr lang="en-US" altLang="ko-KR" sz="1000" dirty="0"/>
+              <a:t> </a:t>
+            </a:r>
+            <a:r>
+              <a:rPr lang="en-US" altLang="ko-KR" sz="1000" dirty="0" smtClean="0"/>
+              <a:t>        {</a:t>
+            </a:r>
+          </a:p>
+          <a:p>
+            <a:r>
+              <a:rPr lang="en-US" altLang="ko-KR" sz="1000" dirty="0"/>
+              <a:t> </a:t>
+            </a:r>
+            <a:r>
+              <a:rPr lang="en-US" altLang="ko-KR" sz="1000" dirty="0" smtClean="0"/>
+              <a:t>           map[y][x] = 1;</a:t>
+            </a:r>
+          </a:p>
+          <a:p>
+            <a:r>
+              <a:rPr lang="en-US" altLang="ko-KR" sz="1000" dirty="0"/>
+              <a:t> </a:t>
+            </a:r>
+            <a:r>
+              <a:rPr lang="en-US" altLang="ko-KR" sz="1000" dirty="0" smtClean="0"/>
+              <a:t>        }</a:t>
+            </a:r>
+          </a:p>
+          <a:p>
+            <a:endParaRPr lang="en-US" altLang="ko-KR" sz="1000" dirty="0" smtClean="0"/>
+          </a:p>
+          <a:p>
+            <a:r>
+              <a:rPr lang="en-US" altLang="ko-KR" sz="1000" dirty="0"/>
+              <a:t> </a:t>
+            </a:r>
+            <a:r>
+              <a:rPr lang="en-US" altLang="ko-KR" sz="1000" dirty="0" smtClean="0"/>
+              <a:t>        map[y][x] = 0;</a:t>
+            </a:r>
+          </a:p>
+          <a:p>
+            <a:r>
+              <a:rPr lang="en-US" altLang="ko-KR" sz="1000" dirty="0"/>
+              <a:t> </a:t>
+            </a:r>
+            <a:r>
+              <a:rPr lang="en-US" altLang="ko-KR" sz="1000" dirty="0" smtClean="0"/>
+              <a:t>     }</a:t>
+            </a:r>
+          </a:p>
+          <a:p>
+            <a:r>
+              <a:rPr lang="en-US" altLang="ko-KR" sz="1000" dirty="0"/>
+              <a:t> </a:t>
+            </a:r>
+            <a:r>
+              <a:rPr lang="en-US" altLang="ko-KR" sz="1000" dirty="0" smtClean="0"/>
+              <a:t>  }</a:t>
+            </a:r>
+            <a:endParaRPr lang="en-US" altLang="ko-KR" sz="1000" dirty="0"/>
+          </a:p>
+          <a:p>
+            <a:r>
+              <a:rPr lang="en-US" altLang="ko-KR" sz="1000" dirty="0" smtClean="0"/>
+              <a:t>}</a:t>
+            </a:r>
+          </a:p>
+          <a:p>
+            <a:endParaRPr lang="en-US" altLang="ko-KR" sz="1000" dirty="0"/>
+          </a:p>
+          <a:p>
+            <a:r>
+              <a:rPr lang="en-US" altLang="ko-KR" sz="1000" dirty="0" smtClean="0"/>
+              <a:t>Void </a:t>
+            </a:r>
+            <a:r>
+              <a:rPr lang="en-US" altLang="ko-KR" sz="1000" dirty="0" err="1" smtClean="0"/>
+              <a:t>UpdateMap</a:t>
+            </a:r>
+            <a:r>
+              <a:rPr lang="en-US" altLang="ko-KR" sz="1000" dirty="0" smtClean="0"/>
+              <a:t>()</a:t>
+            </a:r>
+          </a:p>
+          <a:p>
+            <a:r>
+              <a:rPr lang="en-US" altLang="ko-KR" sz="1000" dirty="0" smtClean="0"/>
+              <a:t>{</a:t>
+            </a:r>
+          </a:p>
+          <a:p>
+            <a:r>
+              <a:rPr lang="nn-NO" altLang="ko-KR" sz="1000" dirty="0" smtClean="0"/>
+              <a:t>   for </a:t>
+            </a:r>
+            <a:r>
+              <a:rPr lang="nn-NO" altLang="ko-KR" sz="1000" dirty="0"/>
+              <a:t>(int i = 0; i &lt; 40; i++)</a:t>
+            </a:r>
+          </a:p>
+          <a:p>
+            <a:r>
+              <a:rPr lang="en-US" altLang="ko-KR" sz="1000" dirty="0" smtClean="0"/>
+              <a:t>   {</a:t>
+            </a:r>
+            <a:endParaRPr lang="en-US" altLang="ko-KR" sz="1000" dirty="0"/>
+          </a:p>
+          <a:p>
+            <a:r>
+              <a:rPr lang="en-US" altLang="ko-KR" sz="1000" dirty="0" smtClean="0"/>
+              <a:t>      for </a:t>
+            </a:r>
+            <a:r>
+              <a:rPr lang="en-US" altLang="ko-KR" sz="1000" dirty="0"/>
+              <a:t>(</a:t>
+            </a:r>
+            <a:r>
+              <a:rPr lang="en-US" altLang="ko-KR" sz="1000" dirty="0" err="1"/>
+              <a:t>int</a:t>
+            </a:r>
+            <a:r>
+              <a:rPr lang="en-US" altLang="ko-KR" sz="1000" dirty="0"/>
+              <a:t> k = 0; k &lt; 20; k++)</a:t>
+            </a:r>
+          </a:p>
+          <a:p>
+            <a:r>
+              <a:rPr lang="en-US" altLang="ko-KR" sz="1000" dirty="0" smtClean="0"/>
+              <a:t>      {</a:t>
+            </a:r>
+            <a:endParaRPr lang="en-US" altLang="ko-KR" sz="1000" dirty="0"/>
+          </a:p>
+          <a:p>
+            <a:r>
+              <a:rPr lang="en-US" altLang="ko-KR" sz="1000" dirty="0" smtClean="0"/>
+              <a:t>         if</a:t>
+            </a:r>
+            <a:r>
+              <a:rPr lang="ko-KR" altLang="en-US" sz="1000" dirty="0" smtClean="0"/>
+              <a:t> </a:t>
+            </a:r>
+            <a:r>
+              <a:rPr lang="en-US" altLang="ko-KR" sz="1000" dirty="0"/>
+              <a:t>(map[</a:t>
+            </a:r>
+            <a:r>
+              <a:rPr lang="en-US" altLang="ko-KR" sz="1000" dirty="0" err="1"/>
+              <a:t>i</a:t>
+            </a:r>
+            <a:r>
+              <a:rPr lang="en-US" altLang="ko-KR" sz="1000" dirty="0"/>
+              <a:t>][k] == </a:t>
+            </a:r>
+            <a:r>
+              <a:rPr lang="en-US" altLang="ko-KR" sz="1000" dirty="0" smtClean="0"/>
+              <a:t>1)</a:t>
+            </a:r>
+          </a:p>
+          <a:p>
+            <a:r>
+              <a:rPr lang="en-US" altLang="ko-KR" sz="1000" dirty="0"/>
+              <a:t> </a:t>
+            </a:r>
+            <a:r>
+              <a:rPr lang="en-US" altLang="ko-KR" sz="1000" dirty="0" smtClean="0"/>
+              <a:t>        {</a:t>
+            </a:r>
+            <a:endParaRPr lang="en-US" altLang="ko-KR" sz="1000" dirty="0"/>
+          </a:p>
+          <a:p>
+            <a:r>
+              <a:rPr lang="en-US" altLang="ko-KR" sz="1000" dirty="0" smtClean="0"/>
+              <a:t>           </a:t>
+            </a:r>
+            <a:r>
+              <a:rPr lang="en-US" altLang="ko-KR" sz="1000" dirty="0" err="1" smtClean="0"/>
+              <a:t>WriteBuffer</a:t>
+            </a:r>
+            <a:r>
+              <a:rPr lang="en-US" altLang="ko-KR" sz="1000" dirty="0" smtClean="0"/>
+              <a:t>(k</a:t>
+            </a:r>
+            <a:r>
+              <a:rPr lang="en-US" altLang="ko-KR" sz="1000" dirty="0"/>
+              <a:t>, </a:t>
+            </a:r>
+            <a:r>
+              <a:rPr lang="en-US" altLang="ko-KR" sz="1000" dirty="0" err="1"/>
+              <a:t>i</a:t>
+            </a:r>
+            <a:r>
+              <a:rPr lang="en-US" altLang="ko-KR" sz="1000" dirty="0"/>
+              <a:t>, "■"); </a:t>
+            </a:r>
+          </a:p>
+          <a:p>
+            <a:r>
+              <a:rPr lang="en-US" altLang="ko-KR" sz="1000" dirty="0" smtClean="0"/>
+              <a:t>         }</a:t>
+            </a:r>
+            <a:endParaRPr lang="en-US" altLang="ko-KR" sz="1000" dirty="0"/>
+          </a:p>
+          <a:p>
+            <a:r>
+              <a:rPr lang="en-US" altLang="ko-KR" sz="1000" dirty="0" smtClean="0"/>
+              <a:t>         else</a:t>
+            </a:r>
+            <a:r>
+              <a:rPr lang="ko-KR" altLang="en-US" sz="1000" dirty="0" smtClean="0"/>
+              <a:t> </a:t>
+            </a:r>
+            <a:endParaRPr lang="en-US" altLang="ko-KR" sz="1000" dirty="0" smtClean="0"/>
+          </a:p>
+          <a:p>
+            <a:r>
+              <a:rPr lang="en-US" altLang="ko-KR" sz="1000" dirty="0"/>
+              <a:t> </a:t>
+            </a:r>
+            <a:r>
+              <a:rPr lang="en-US" altLang="ko-KR" sz="1000" dirty="0" smtClean="0"/>
+              <a:t>        {</a:t>
+            </a:r>
+            <a:endParaRPr lang="en-US" altLang="ko-KR" sz="1000" dirty="0"/>
+          </a:p>
+          <a:p>
+            <a:r>
+              <a:rPr lang="en-US" altLang="ko-KR" sz="1000" dirty="0" smtClean="0"/>
+              <a:t>            </a:t>
+            </a:r>
+            <a:r>
+              <a:rPr lang="en-US" altLang="ko-KR" sz="1000" dirty="0" err="1" smtClean="0"/>
+              <a:t>WriteBuffer</a:t>
+            </a:r>
+            <a:r>
+              <a:rPr lang="en-US" altLang="ko-KR" sz="1000" dirty="0" smtClean="0"/>
+              <a:t>(k</a:t>
+            </a:r>
+            <a:r>
+              <a:rPr lang="en-US" altLang="ko-KR" sz="1000" dirty="0"/>
+              <a:t>, </a:t>
+            </a:r>
+            <a:r>
+              <a:rPr lang="en-US" altLang="ko-KR" sz="1000" dirty="0" err="1"/>
+              <a:t>i</a:t>
+            </a:r>
+            <a:r>
+              <a:rPr lang="en-US" altLang="ko-KR" sz="1000" dirty="0"/>
+              <a:t>, "□");</a:t>
+            </a:r>
+          </a:p>
+          <a:p>
+            <a:r>
+              <a:rPr lang="en-US" altLang="ko-KR" sz="1000" dirty="0" smtClean="0"/>
+              <a:t>         }</a:t>
+            </a:r>
+            <a:endParaRPr lang="en-US" altLang="ko-KR" sz="1000" dirty="0"/>
+          </a:p>
+          <a:p>
+            <a:r>
+              <a:rPr lang="en-US" altLang="ko-KR" sz="1000" dirty="0" smtClean="0"/>
+              <a:t>      }</a:t>
+            </a:r>
+            <a:endParaRPr lang="en-US" altLang="ko-KR" sz="1000" dirty="0"/>
+          </a:p>
+          <a:p>
+            <a:r>
+              <a:rPr lang="en-US" altLang="ko-KR" sz="1000" dirty="0" smtClean="0"/>
+              <a:t>   }</a:t>
+            </a:r>
+            <a:endParaRPr lang="en-US" altLang="ko-KR" sz="1000" dirty="0"/>
+          </a:p>
+          <a:p>
+            <a:r>
+              <a:rPr lang="en-US" altLang="ko-KR" sz="1000" dirty="0" smtClean="0"/>
+              <a:t>}</a:t>
+            </a:r>
+            <a:endParaRPr lang="ko-KR" altLang="en-US" sz="1000" dirty="0"/>
           </a:p>
         </p:txBody>
       </p:sp>
@@ -7408,8 +9171,8 @@
         </p:nvSpPr>
         <p:spPr>
           <a:xfrm>
-            <a:off x="337751" y="230658"/>
-            <a:ext cx="6293708" cy="1477328"/>
+            <a:off x="57665" y="82377"/>
+            <a:ext cx="6293708" cy="2400657"/>
           </a:xfrm>
           <a:prstGeom prst="rect">
             <a:avLst/>
@@ -7423,33 +9186,388 @@
           <a:lstStyle/>
           <a:p>
             <a:r>
-              <a:rPr lang="en-US" altLang="ko-KR" dirty="0" smtClean="0"/>
+              <a:rPr lang="en-US" altLang="ko-KR" sz="1000" dirty="0" smtClean="0"/>
               <a:t>Class </a:t>
             </a:r>
             <a:r>
-              <a:rPr lang="en-US" altLang="ko-KR" dirty="0" err="1" smtClean="0"/>
+              <a:rPr lang="en-US" altLang="ko-KR" sz="1000" dirty="0" err="1" smtClean="0"/>
               <a:t>GameMain</a:t>
             </a:r>
-            <a:endParaRPr lang="en-US" altLang="ko-KR" dirty="0" smtClean="0"/>
-          </a:p>
-          <a:p>
-            <a:r>
-              <a:rPr lang="en-US" altLang="ko-KR" dirty="0" smtClean="0"/>
+            <a:endParaRPr lang="en-US" altLang="ko-KR" sz="1000" dirty="0" smtClean="0"/>
+          </a:p>
+          <a:p>
+            <a:r>
+              <a:rPr lang="en-US" altLang="ko-KR" sz="1000" dirty="0" smtClean="0"/>
               <a:t>{</a:t>
             </a:r>
           </a:p>
           <a:p>
-            <a:endParaRPr lang="en-US" altLang="ko-KR" dirty="0" smtClean="0"/>
-          </a:p>
-          <a:p>
-            <a:endParaRPr lang="en-US" altLang="ko-KR" dirty="0"/>
-          </a:p>
-          <a:p>
-            <a:r>
-              <a:rPr lang="en-US" altLang="ko-KR" dirty="0" smtClean="0"/>
+            <a:r>
+              <a:rPr lang="en-US" altLang="ko-KR" sz="1000" dirty="0"/>
+              <a:t> </a:t>
+            </a:r>
+            <a:r>
+              <a:rPr lang="en-US" altLang="ko-KR" sz="1000" dirty="0" smtClean="0"/>
+              <a:t>private:</a:t>
+            </a:r>
+          </a:p>
+          <a:p>
+            <a:r>
+              <a:rPr lang="en-US" altLang="ko-KR" sz="1000" dirty="0" smtClean="0"/>
+              <a:t>    Tetris </a:t>
+            </a:r>
+            <a:r>
+              <a:rPr lang="en-US" altLang="ko-KR" sz="1000" dirty="0" err="1" smtClean="0"/>
+              <a:t>tr</a:t>
+            </a:r>
+            <a:r>
+              <a:rPr lang="en-US" altLang="ko-KR" sz="1000" dirty="0" smtClean="0"/>
+              <a:t>;</a:t>
+            </a:r>
+          </a:p>
+          <a:p>
+            <a:r>
+              <a:rPr lang="en-US" altLang="ko-KR" sz="1000" dirty="0"/>
+              <a:t> </a:t>
+            </a:r>
+            <a:r>
+              <a:rPr lang="en-US" altLang="ko-KR" sz="1000" dirty="0" smtClean="0"/>
+              <a:t>   </a:t>
+            </a:r>
+            <a:r>
+              <a:rPr lang="en-US" altLang="ko-KR" sz="1000" dirty="0" err="1" smtClean="0"/>
+              <a:t>TetrisChief</a:t>
+            </a:r>
+            <a:r>
+              <a:rPr lang="en-US" altLang="ko-KR" sz="1000" dirty="0" smtClean="0"/>
+              <a:t> </a:t>
+            </a:r>
+            <a:r>
+              <a:rPr lang="en-US" altLang="ko-KR" sz="1000" dirty="0" err="1" smtClean="0"/>
+              <a:t>tc</a:t>
+            </a:r>
+            <a:r>
+              <a:rPr lang="en-US" altLang="ko-KR" sz="1000" dirty="0" smtClean="0"/>
+              <a:t>;</a:t>
+            </a:r>
+          </a:p>
+          <a:p>
+            <a:r>
+              <a:rPr lang="en-US" altLang="ko-KR" sz="1000" dirty="0"/>
+              <a:t> </a:t>
+            </a:r>
+            <a:r>
+              <a:rPr lang="en-US" altLang="ko-KR" sz="1000" dirty="0" smtClean="0"/>
+              <a:t>   Map </a:t>
+            </a:r>
+            <a:r>
+              <a:rPr lang="en-US" altLang="ko-KR" sz="1000" dirty="0" err="1" smtClean="0"/>
+              <a:t>mp</a:t>
+            </a:r>
+            <a:r>
+              <a:rPr lang="en-US" altLang="ko-KR" sz="1000" dirty="0" smtClean="0"/>
+              <a:t>;</a:t>
+            </a:r>
+          </a:p>
+          <a:p>
+            <a:r>
+              <a:rPr lang="en-US" altLang="ko-KR" sz="1000" dirty="0"/>
+              <a:t> </a:t>
+            </a:r>
+            <a:r>
+              <a:rPr lang="en-US" altLang="ko-KR" sz="1000" dirty="0" smtClean="0"/>
+              <a:t>   </a:t>
+            </a:r>
+            <a:r>
+              <a:rPr lang="en-US" altLang="ko-KR" sz="1000" dirty="0" err="1" smtClean="0"/>
+              <a:t>int</a:t>
+            </a:r>
+            <a:r>
+              <a:rPr lang="en-US" altLang="ko-KR" sz="1000" dirty="0" smtClean="0"/>
+              <a:t> key = 0;</a:t>
+            </a:r>
+            <a:endParaRPr lang="en-US" altLang="ko-KR" sz="1000" dirty="0" smtClean="0"/>
+          </a:p>
+          <a:p>
+            <a:r>
+              <a:rPr lang="en-US" altLang="ko-KR" sz="1000" dirty="0"/>
+              <a:t> </a:t>
+            </a:r>
+            <a:r>
+              <a:rPr lang="en-US" altLang="ko-KR" sz="1000" dirty="0" smtClean="0"/>
+              <a:t>public:</a:t>
+            </a:r>
+          </a:p>
+          <a:p>
+            <a:r>
+              <a:rPr lang="en-US" altLang="ko-KR" sz="1000" dirty="0" smtClean="0"/>
+              <a:t>    void </a:t>
+            </a:r>
+            <a:r>
+              <a:rPr lang="en-US" altLang="ko-KR" sz="1000" dirty="0" err="1" smtClean="0"/>
+              <a:t>Init</a:t>
+            </a:r>
+            <a:r>
+              <a:rPr lang="en-US" altLang="ko-KR" sz="1000" dirty="0" smtClean="0"/>
+              <a:t>();</a:t>
+            </a:r>
+          </a:p>
+          <a:p>
+            <a:r>
+              <a:rPr lang="en-US" altLang="ko-KR" sz="1000" dirty="0"/>
+              <a:t> </a:t>
+            </a:r>
+            <a:r>
+              <a:rPr lang="en-US" altLang="ko-KR" sz="1000" dirty="0" smtClean="0"/>
+              <a:t>   void Update();</a:t>
+            </a:r>
+          </a:p>
+          <a:p>
+            <a:r>
+              <a:rPr lang="en-US" altLang="ko-KR" sz="1000" dirty="0"/>
+              <a:t> </a:t>
+            </a:r>
+            <a:r>
+              <a:rPr lang="en-US" altLang="ko-KR" sz="1000" dirty="0" smtClean="0"/>
+              <a:t>   void Release();</a:t>
+            </a:r>
+            <a:endParaRPr lang="en-US" altLang="ko-KR" sz="1000" dirty="0"/>
+          </a:p>
+          <a:p>
+            <a:r>
+              <a:rPr lang="en-US" altLang="ko-KR" sz="1000" dirty="0" smtClean="0"/>
               <a:t>}</a:t>
             </a:r>
-            <a:endParaRPr lang="ko-KR" altLang="en-US" dirty="0"/>
+          </a:p>
+          <a:p>
+            <a:endParaRPr lang="en-US" altLang="ko-KR" sz="1000" dirty="0"/>
+          </a:p>
+          <a:p>
+            <a:endParaRPr lang="en-US" altLang="ko-KR" sz="1000" dirty="0" smtClean="0"/>
+          </a:p>
+          <a:p>
+            <a:endParaRPr lang="en-US" altLang="ko-KR" sz="1000" dirty="0"/>
+          </a:p>
+        </p:txBody>
+      </p:sp>
+      <p:sp>
+        <p:nvSpPr>
+          <p:cNvPr id="3" name="TextBox 2"/>
+          <p:cNvSpPr txBox="1"/>
+          <p:nvPr/>
+        </p:nvSpPr>
+        <p:spPr>
+          <a:xfrm>
+            <a:off x="1717589" y="82376"/>
+            <a:ext cx="6293708" cy="2862322"/>
+          </a:xfrm>
+          <a:prstGeom prst="rect">
+            <a:avLst/>
+          </a:prstGeom>
+          <a:noFill/>
+        </p:spPr>
+        <p:txBody>
+          <a:bodyPr wrap="square" rtlCol="0">
+            <a:spAutoFit/>
+          </a:bodyPr>
+          <a:lstStyle/>
+          <a:p>
+            <a:r>
+              <a:rPr lang="en-US" altLang="ko-KR" sz="1000" dirty="0" smtClean="0"/>
+              <a:t>Void </a:t>
+            </a:r>
+            <a:r>
+              <a:rPr lang="en-US" altLang="ko-KR" sz="1000" dirty="0" err="1" smtClean="0"/>
+              <a:t>Init</a:t>
+            </a:r>
+            <a:r>
+              <a:rPr lang="en-US" altLang="ko-KR" sz="1000" dirty="0" smtClean="0"/>
+              <a:t>()</a:t>
+            </a:r>
+          </a:p>
+          <a:p>
+            <a:r>
+              <a:rPr lang="en-US" altLang="ko-KR" sz="1000" dirty="0" smtClean="0"/>
+              <a:t>{</a:t>
+            </a:r>
+          </a:p>
+          <a:p>
+            <a:r>
+              <a:rPr lang="en-US" altLang="ko-KR" sz="1000" dirty="0"/>
+              <a:t> </a:t>
+            </a:r>
+            <a:r>
+              <a:rPr lang="en-US" altLang="ko-KR" sz="1000" dirty="0" smtClean="0"/>
+              <a:t>  </a:t>
+            </a:r>
+            <a:r>
+              <a:rPr lang="en-US" altLang="ko-KR" sz="1000" dirty="0" err="1" smtClean="0"/>
+              <a:t>mp</a:t>
+            </a:r>
+            <a:r>
+              <a:rPr lang="en-US" altLang="ko-KR" sz="1000" dirty="0" smtClean="0"/>
+              <a:t> = new Map();</a:t>
+            </a:r>
+          </a:p>
+          <a:p>
+            <a:r>
+              <a:rPr lang="en-US" altLang="ko-KR" sz="1000" dirty="0"/>
+              <a:t> </a:t>
+            </a:r>
+            <a:r>
+              <a:rPr lang="en-US" altLang="ko-KR" sz="1000" dirty="0" smtClean="0"/>
+              <a:t>  </a:t>
+            </a:r>
+            <a:r>
+              <a:rPr lang="en-US" altLang="ko-KR" sz="1000" dirty="0" err="1" smtClean="0"/>
+              <a:t>tc</a:t>
+            </a:r>
+            <a:r>
+              <a:rPr lang="en-US" altLang="ko-KR" sz="1000" dirty="0" smtClean="0"/>
+              <a:t> = new </a:t>
+            </a:r>
+            <a:r>
+              <a:rPr lang="en-US" altLang="ko-KR" sz="1000" dirty="0" err="1" smtClean="0"/>
+              <a:t>TetrisChief</a:t>
+            </a:r>
+            <a:r>
+              <a:rPr lang="en-US" altLang="ko-KR" sz="1000" dirty="0" smtClean="0"/>
+              <a:t>(&amp;map);</a:t>
+            </a:r>
+          </a:p>
+          <a:p>
+            <a:r>
+              <a:rPr lang="en-US" altLang="ko-KR" sz="1000" dirty="0" smtClean="0"/>
+              <a:t>   </a:t>
+            </a:r>
+            <a:r>
+              <a:rPr lang="en-US" altLang="ko-KR" sz="1000" dirty="0" err="1" smtClean="0"/>
+              <a:t>tr</a:t>
+            </a:r>
+            <a:r>
+              <a:rPr lang="en-US" altLang="ko-KR" sz="1000" dirty="0" smtClean="0"/>
+              <a:t> = </a:t>
+            </a:r>
+            <a:r>
+              <a:rPr lang="en-US" altLang="ko-KR" sz="1000" dirty="0"/>
+              <a:t>new </a:t>
+            </a:r>
+            <a:r>
+              <a:rPr lang="en-US" altLang="ko-KR" sz="1000" dirty="0" smtClean="0"/>
+              <a:t>Tetris(&amp;map);</a:t>
+            </a:r>
+          </a:p>
+          <a:p>
+            <a:r>
+              <a:rPr lang="en-US" altLang="ko-KR" sz="1000" dirty="0"/>
+              <a:t>}</a:t>
+            </a:r>
+            <a:endParaRPr lang="en-US" altLang="ko-KR" sz="1000" dirty="0" smtClean="0"/>
+          </a:p>
+          <a:p>
+            <a:endParaRPr lang="en-US" altLang="ko-KR" sz="1000" dirty="0" smtClean="0"/>
+          </a:p>
+          <a:p>
+            <a:r>
+              <a:rPr lang="en-US" altLang="ko-KR" sz="1000" dirty="0" smtClean="0"/>
+              <a:t>Void Update()</a:t>
+            </a:r>
+          </a:p>
+          <a:p>
+            <a:r>
+              <a:rPr lang="en-US" altLang="ko-KR" sz="1000" dirty="0" smtClean="0"/>
+              <a:t>{</a:t>
+            </a:r>
+          </a:p>
+          <a:p>
+            <a:r>
+              <a:rPr lang="en-US" altLang="ko-KR" sz="1000" dirty="0" smtClean="0"/>
+              <a:t>   </a:t>
+            </a:r>
+            <a:endParaRPr lang="en-US" altLang="ko-KR" sz="1000" dirty="0"/>
+          </a:p>
+          <a:p>
+            <a:r>
+              <a:rPr lang="en-US" altLang="ko-KR" sz="1000" dirty="0" smtClean="0"/>
+              <a:t>}</a:t>
+            </a:r>
+          </a:p>
+          <a:p>
+            <a:endParaRPr lang="en-US" altLang="ko-KR" sz="1000" dirty="0"/>
+          </a:p>
+          <a:p>
+            <a:r>
+              <a:rPr lang="en-US" altLang="ko-KR" sz="1000" dirty="0" smtClean="0"/>
+              <a:t>Void Release()</a:t>
+            </a:r>
+          </a:p>
+          <a:p>
+            <a:r>
+              <a:rPr lang="en-US" altLang="ko-KR" sz="1000" dirty="0" smtClean="0"/>
+              <a:t>{</a:t>
+            </a:r>
+          </a:p>
+          <a:p>
+            <a:r>
+              <a:rPr lang="en-US" altLang="ko-KR" sz="1000" dirty="0" smtClean="0"/>
+              <a:t>   delete </a:t>
+            </a:r>
+            <a:r>
+              <a:rPr lang="en-US" altLang="ko-KR" sz="1000" dirty="0" err="1" smtClean="0"/>
+              <a:t>tr</a:t>
+            </a:r>
+            <a:r>
+              <a:rPr lang="en-US" altLang="ko-KR" sz="1000" dirty="0" smtClean="0"/>
+              <a:t>;</a:t>
+            </a:r>
+          </a:p>
+          <a:p>
+            <a:r>
+              <a:rPr lang="en-US" altLang="ko-KR" sz="1000" dirty="0"/>
+              <a:t> </a:t>
+            </a:r>
+            <a:r>
+              <a:rPr lang="en-US" altLang="ko-KR" sz="1000" dirty="0" smtClean="0"/>
+              <a:t>  delete </a:t>
+            </a:r>
+            <a:r>
+              <a:rPr lang="en-US" altLang="ko-KR" sz="1000" dirty="0" err="1" smtClean="0"/>
+              <a:t>tc</a:t>
+            </a:r>
+            <a:r>
+              <a:rPr lang="en-US" altLang="ko-KR" sz="1000" dirty="0" smtClean="0"/>
+              <a:t>;</a:t>
+            </a:r>
+          </a:p>
+          <a:p>
+            <a:r>
+              <a:rPr lang="en-US" altLang="ko-KR" sz="1000" dirty="0"/>
+              <a:t> </a:t>
+            </a:r>
+            <a:r>
+              <a:rPr lang="en-US" altLang="ko-KR" sz="1000" dirty="0" smtClean="0"/>
+              <a:t>  </a:t>
+            </a:r>
+            <a:r>
+              <a:rPr lang="en-US" altLang="ko-KR" sz="1000" dirty="0" smtClean="0"/>
+              <a:t>delete </a:t>
+            </a:r>
+            <a:r>
+              <a:rPr lang="en-US" altLang="ko-KR" sz="1000" dirty="0" err="1" smtClean="0"/>
+              <a:t>mp</a:t>
+            </a:r>
+            <a:r>
+              <a:rPr lang="en-US" altLang="ko-KR" sz="1000" dirty="0" smtClean="0"/>
+              <a:t>;</a:t>
+            </a:r>
+            <a:endParaRPr lang="en-US" altLang="ko-KR" sz="1000" dirty="0"/>
+          </a:p>
+          <a:p>
+            <a:r>
+              <a:rPr lang="en-US" altLang="ko-KR" sz="1000" dirty="0" smtClean="0"/>
+              <a:t>}</a:t>
+            </a:r>
+            <a:endParaRPr lang="en-US" altLang="ko-KR" sz="1000" dirty="0"/>
           </a:p>
         </p:txBody>
       </p:sp>
@@ -7491,8 +9609,8 @@
         </p:nvSpPr>
         <p:spPr>
           <a:xfrm>
-            <a:off x="337751" y="230658"/>
-            <a:ext cx="6293708" cy="1477328"/>
+            <a:off x="181232" y="123566"/>
+            <a:ext cx="6293708" cy="1631216"/>
           </a:xfrm>
           <a:prstGeom prst="rect">
             <a:avLst/>
@@ -7506,32 +9624,103 @@
           <a:lstStyle/>
           <a:p>
             <a:r>
-              <a:rPr lang="en-US" altLang="ko-KR" dirty="0" err="1" smtClean="0"/>
+              <a:rPr lang="en-US" altLang="ko-KR" sz="1000" dirty="0" err="1" smtClean="0"/>
               <a:t>Int</a:t>
             </a:r>
             <a:r>
-              <a:rPr lang="en-US" altLang="ko-KR" dirty="0" smtClean="0"/>
+              <a:rPr lang="en-US" altLang="ko-KR" sz="1000" dirty="0" smtClean="0"/>
               <a:t> main(void)</a:t>
             </a:r>
           </a:p>
           <a:p>
             <a:r>
-              <a:rPr lang="en-US" altLang="ko-KR" dirty="0" smtClean="0"/>
+              <a:rPr lang="en-US" altLang="ko-KR" sz="1000" dirty="0" smtClean="0"/>
               <a:t>{</a:t>
             </a:r>
           </a:p>
           <a:p>
-            <a:endParaRPr lang="en-US" altLang="ko-KR" dirty="0" smtClean="0"/>
-          </a:p>
-          <a:p>
-            <a:endParaRPr lang="en-US" altLang="ko-KR" dirty="0"/>
-          </a:p>
-          <a:p>
-            <a:r>
-              <a:rPr lang="en-US" altLang="ko-KR" dirty="0" smtClean="0"/>
+            <a:r>
+              <a:rPr lang="en-US" altLang="ko-KR" sz="1000" dirty="0" smtClean="0"/>
+              <a:t>   </a:t>
+            </a:r>
+            <a:r>
+              <a:rPr lang="en-US" altLang="ko-KR" sz="1000" dirty="0" err="1" smtClean="0"/>
+              <a:t>GameMain</a:t>
+            </a:r>
+            <a:r>
+              <a:rPr lang="en-US" altLang="ko-KR" sz="1000" dirty="0"/>
+              <a:t> </a:t>
+            </a:r>
+            <a:r>
+              <a:rPr lang="en-US" altLang="ko-KR" sz="1000" dirty="0" smtClean="0"/>
+              <a:t>gm = new </a:t>
+            </a:r>
+            <a:r>
+              <a:rPr lang="en-US" altLang="ko-KR" sz="1000" dirty="0" err="1" smtClean="0"/>
+              <a:t>GameMain</a:t>
+            </a:r>
+            <a:r>
+              <a:rPr lang="en-US" altLang="ko-KR" sz="1000" dirty="0" smtClean="0"/>
+              <a:t>();</a:t>
+            </a:r>
+          </a:p>
+          <a:p>
+            <a:r>
+              <a:rPr lang="en-US" altLang="ko-KR" sz="1000" dirty="0"/>
+              <a:t> </a:t>
+            </a:r>
+            <a:r>
+              <a:rPr lang="en-US" altLang="ko-KR" sz="1000" dirty="0" smtClean="0"/>
+              <a:t> </a:t>
+            </a:r>
+          </a:p>
+          <a:p>
+            <a:r>
+              <a:rPr lang="en-US" altLang="ko-KR" sz="1000" dirty="0"/>
+              <a:t> </a:t>
+            </a:r>
+            <a:r>
+              <a:rPr lang="en-US" altLang="ko-KR" sz="1000" dirty="0" smtClean="0"/>
+              <a:t>  gm-&gt;</a:t>
+            </a:r>
+            <a:r>
+              <a:rPr lang="en-US" altLang="ko-KR" sz="1000" dirty="0" err="1" smtClean="0"/>
+              <a:t>Init</a:t>
+            </a:r>
+            <a:r>
+              <a:rPr lang="en-US" altLang="ko-KR" sz="1000" dirty="0" smtClean="0"/>
+              <a:t>(); </a:t>
+            </a:r>
+          </a:p>
+          <a:p>
+            <a:r>
+              <a:rPr lang="en-US" altLang="ko-KR" sz="1000" dirty="0" smtClean="0"/>
+              <a:t>   gm-&gt;Update(); </a:t>
+            </a:r>
+            <a:endParaRPr lang="en-US" altLang="ko-KR" sz="1000" dirty="0"/>
+          </a:p>
+          <a:p>
+            <a:r>
+              <a:rPr lang="en-US" altLang="ko-KR" sz="1000" dirty="0" smtClean="0"/>
+              <a:t>   gm-&gt;Release(); </a:t>
+            </a:r>
+          </a:p>
+          <a:p>
+            <a:endParaRPr lang="en-US" altLang="ko-KR" sz="1000" dirty="0"/>
+          </a:p>
+          <a:p>
+            <a:r>
+              <a:rPr lang="en-US" altLang="ko-KR" sz="1000" dirty="0" smtClean="0"/>
+              <a:t>   return 0;</a:t>
+            </a:r>
+            <a:endParaRPr lang="en-US" altLang="ko-KR" sz="1000" dirty="0"/>
+          </a:p>
+          <a:p>
+            <a:r>
+              <a:rPr lang="en-US" altLang="ko-KR" sz="1000" dirty="0" smtClean="0"/>
               <a:t>}</a:t>
             </a:r>
-            <a:endParaRPr lang="ko-KR" altLang="en-US" dirty="0"/>
+            <a:endParaRPr lang="ko-KR" altLang="en-US" sz="1000" dirty="0"/>
           </a:p>
         </p:txBody>
       </p:sp>

</xml_diff>